<commit_message>
Modify the slides for the final presentation
</commit_message>
<xml_diff>
--- a/doc/project_status_21_09_2020.pptx
+++ b/doc/project_status_21_09_2020.pptx
@@ -5,21 +5,17 @@
     <p:sldMasterId id="2147483796" r:id="rId1"/>
   </p:sldMasterIdLst>
   <p:notesMasterIdLst>
-    <p:notesMasterId r:id="rId11"/>
+    <p:notesMasterId r:id="rId7"/>
   </p:notesMasterIdLst>
   <p:handoutMasterIdLst>
-    <p:handoutMasterId r:id="rId12"/>
+    <p:handoutMasterId r:id="rId8"/>
   </p:handoutMasterIdLst>
   <p:sldIdLst>
     <p:sldId id="260" r:id="rId2"/>
     <p:sldId id="262" r:id="rId3"/>
     <p:sldId id="261" r:id="rId4"/>
-    <p:sldId id="263" r:id="rId5"/>
-    <p:sldId id="259" r:id="rId6"/>
-    <p:sldId id="264" r:id="rId7"/>
-    <p:sldId id="257" r:id="rId8"/>
-    <p:sldId id="256" r:id="rId9"/>
-    <p:sldId id="258" r:id="rId10"/>
+    <p:sldId id="259" r:id="rId5"/>
+    <p:sldId id="264" r:id="rId6"/>
   </p:sldIdLst>
   <p:sldSz cx="12192000" cy="6858000"/>
   <p:notesSz cx="6858000" cy="9144000"/>
@@ -156,7 +152,7 @@
           <p:cNvPr id="2" name="Espace réservé de l'en-tête 1">
             <a:extLst>
               <a:ext uri="{FF2B5EF4-FFF2-40B4-BE49-F238E27FC236}">
-                <a16:creationId xmlns:a16="http://schemas.microsoft.com/office/drawing/2014/main" xmlns="" id="{50E97D5F-B521-4E20-9A0E-0259C90E0137}"/>
+                <a16:creationId xmlns:a16="http://schemas.microsoft.com/office/drawing/2014/main" id="{50E97D5F-B521-4E20-9A0E-0259C90E0137}"/>
               </a:ext>
             </a:extLst>
           </p:cNvPr>
@@ -193,7 +189,7 @@
           <p:cNvPr id="3" name="Espace réservé de la date 2">
             <a:extLst>
               <a:ext uri="{FF2B5EF4-FFF2-40B4-BE49-F238E27FC236}">
-                <a16:creationId xmlns:a16="http://schemas.microsoft.com/office/drawing/2014/main" xmlns="" id="{AEB20715-9931-4EF6-AFFF-8C877A6D31CC}"/>
+                <a16:creationId xmlns:a16="http://schemas.microsoft.com/office/drawing/2014/main" id="{AEB20715-9931-4EF6-AFFF-8C877A6D31CC}"/>
               </a:ext>
             </a:extLst>
           </p:cNvPr>
@@ -234,7 +230,7 @@
           <p:cNvPr id="4" name="Espace réservé du pied de page 3">
             <a:extLst>
               <a:ext uri="{FF2B5EF4-FFF2-40B4-BE49-F238E27FC236}">
-                <a16:creationId xmlns:a16="http://schemas.microsoft.com/office/drawing/2014/main" xmlns="" id="{DF817C65-4209-41AC-857F-FBBA0334BFFC}"/>
+                <a16:creationId xmlns:a16="http://schemas.microsoft.com/office/drawing/2014/main" id="{DF817C65-4209-41AC-857F-FBBA0334BFFC}"/>
               </a:ext>
             </a:extLst>
           </p:cNvPr>
@@ -271,7 +267,7 @@
           <p:cNvPr id="5" name="Espace réservé du numéro de diapositive 4">
             <a:extLst>
               <a:ext uri="{FF2B5EF4-FFF2-40B4-BE49-F238E27FC236}">
-                <a16:creationId xmlns:a16="http://schemas.microsoft.com/office/drawing/2014/main" xmlns="" id="{677F6880-296C-4E0D-BF19-66D0A1134229}"/>
+                <a16:creationId xmlns:a16="http://schemas.microsoft.com/office/drawing/2014/main" id="{677F6880-296C-4E0D-BF19-66D0A1134229}"/>
               </a:ext>
             </a:extLst>
           </p:cNvPr>
@@ -733,7 +729,7 @@
           <a:p>
             <a:fld id="{F217D820-57D8-450B-BD3E-2ECF36C52576}" type="slidenum">
               <a:rPr lang="fr-CH" smtClean="0"/>
-              <a:t>8</a:t>
+              <a:t>1</a:t>
             </a:fld>
             <a:endParaRPr lang="fr-CH"/>
           </a:p>
@@ -742,7 +738,7 @@
     </p:spTree>
     <p:extLst>
       <p:ext uri="{BB962C8B-B14F-4D97-AF65-F5344CB8AC3E}">
-        <p14:creationId xmlns:p14="http://schemas.microsoft.com/office/powerpoint/2010/main" val="2273163912"/>
+        <p14:creationId xmlns:p14="http://schemas.microsoft.com/office/powerpoint/2010/main" val="299591304"/>
       </p:ext>
     </p:extLst>
   </p:cSld>
@@ -798,7 +794,7 @@
           </a:lstStyle>
           <a:p>
             <a:r>
-              <a:rPr lang="fr-FR" smtClean="0"/>
+              <a:rPr lang="fr-FR"/>
               <a:t>Modifiez le style du titre</a:t>
             </a:r>
             <a:endParaRPr lang="en-US" dirty="0"/>
@@ -919,7 +915,7 @@
           </a:lstStyle>
           <a:p>
             <a:r>
-              <a:rPr lang="fr-FR" smtClean="0"/>
+              <a:rPr lang="fr-FR"/>
               <a:t>Modifiez le style des sous-titres du masque</a:t>
             </a:r>
             <a:endParaRPr lang="en-US" dirty="0"/>
@@ -1212,7 +1208,7 @@
           <a:lstStyle/>
           <a:p>
             <a:r>
-              <a:rPr lang="fr-FR" smtClean="0"/>
+              <a:rPr lang="fr-FR"/>
               <a:t>Modifiez le style du titre</a:t>
             </a:r>
             <a:endParaRPr lang="en-US" dirty="0"/>
@@ -1299,7 +1295,7 @@
           </a:lstStyle>
           <a:p>
             <a:r>
-              <a:rPr lang="fr-FR" smtClean="0"/>
+              <a:rPr lang="fr-FR"/>
               <a:t>Cliquez sur l'icône pour ajouter une image</a:t>
             </a:r>
             <a:endParaRPr lang="en-US" dirty="0"/>
@@ -1356,7 +1352,7 @@
           <a:p>
             <a:pPr lvl="0"/>
             <a:r>
-              <a:rPr lang="fr-FR" smtClean="0"/>
+              <a:rPr lang="fr-FR"/>
               <a:t>Modifiez les styles du texte du masque</a:t>
             </a:r>
           </a:p>
@@ -1484,7 +1480,7 @@
           </a:lstStyle>
           <a:p>
             <a:r>
-              <a:rPr lang="fr-FR" smtClean="0"/>
+              <a:rPr lang="fr-FR"/>
               <a:t>Modifiez le style du titre</a:t>
             </a:r>
             <a:endParaRPr lang="en-US" dirty="0"/>
@@ -1606,7 +1602,7 @@
           <a:p>
             <a:pPr lvl="0"/>
             <a:r>
-              <a:rPr lang="fr-FR" smtClean="0"/>
+              <a:rPr lang="fr-FR"/>
               <a:t>Modifiez les styles du texte du masque</a:t>
             </a:r>
           </a:p>
@@ -1738,7 +1734,7 @@
           </a:lstStyle>
           <a:p>
             <a:r>
-              <a:rPr lang="fr-FR" smtClean="0"/>
+              <a:rPr lang="fr-FR"/>
               <a:t>Modifiez le style du titre</a:t>
             </a:r>
             <a:endParaRPr lang="en-US" dirty="0"/>
@@ -1793,7 +1789,7 @@
           <a:p>
             <a:pPr lvl="0"/>
             <a:r>
-              <a:rPr lang="fr-FR" smtClean="0"/>
+              <a:rPr lang="fr-FR"/>
               <a:t>Modifiez les styles du texte du masque</a:t>
             </a:r>
           </a:p>
@@ -1914,7 +1910,7 @@
           <a:p>
             <a:pPr lvl="0"/>
             <a:r>
-              <a:rPr lang="fr-FR" smtClean="0"/>
+              <a:rPr lang="fr-FR"/>
               <a:t>Modifiez les styles du texte du masque</a:t>
             </a:r>
           </a:p>
@@ -2110,7 +2106,7 @@
           </a:lstStyle>
           <a:p>
             <a:r>
-              <a:rPr lang="fr-FR" smtClean="0"/>
+              <a:rPr lang="fr-FR"/>
               <a:t>Modifiez le style du titre</a:t>
             </a:r>
             <a:endParaRPr lang="en-US" dirty="0"/>
@@ -2232,7 +2228,7 @@
           <a:p>
             <a:pPr lvl="0"/>
             <a:r>
-              <a:rPr lang="fr-FR" smtClean="0"/>
+              <a:rPr lang="fr-FR"/>
               <a:t>Modifiez les styles du texte du masque</a:t>
             </a:r>
           </a:p>
@@ -2364,7 +2360,7 @@
           </a:lstStyle>
           <a:p>
             <a:r>
-              <a:rPr lang="fr-FR" smtClean="0"/>
+              <a:rPr lang="fr-FR"/>
               <a:t>Modifiez le style du titre</a:t>
             </a:r>
             <a:endParaRPr lang="en-US" dirty="0"/>
@@ -2413,7 +2409,7 @@
               <a:buNone/>
             </a:pPr>
             <a:r>
-              <a:rPr lang="fr-FR" smtClean="0"/>
+              <a:rPr lang="fr-FR"/>
               <a:t>Modifiez les styles du texte du masque</a:t>
             </a:r>
           </a:p>
@@ -2534,7 +2530,7 @@
           <a:p>
             <a:pPr lvl="0"/>
             <a:r>
-              <a:rPr lang="fr-FR" smtClean="0"/>
+              <a:rPr lang="fr-FR"/>
               <a:t>Modifiez les styles du texte du masque</a:t>
             </a:r>
           </a:p>
@@ -2731,7 +2727,7 @@
           <a:p>
             <a:pPr marL="0" lvl="0"/>
             <a:r>
-              <a:rPr lang="fr-FR" smtClean="0"/>
+              <a:rPr lang="fr-FR"/>
               <a:t>Modifiez le style du titre</a:t>
             </a:r>
             <a:endParaRPr lang="en-US" dirty="0"/>
@@ -2780,7 +2776,7 @@
               <a:buNone/>
             </a:pPr>
             <a:r>
-              <a:rPr lang="fr-FR" smtClean="0"/>
+              <a:rPr lang="fr-FR"/>
               <a:t>Modifiez les styles du texte du masque</a:t>
             </a:r>
           </a:p>
@@ -2901,7 +2897,7 @@
           <a:p>
             <a:pPr lvl="0"/>
             <a:r>
-              <a:rPr lang="fr-FR" smtClean="0"/>
+              <a:rPr lang="fr-FR"/>
               <a:t>Modifiez les styles du texte du masque</a:t>
             </a:r>
           </a:p>
@@ -3022,7 +3018,7 @@
           </a:lstStyle>
           <a:p>
             <a:r>
-              <a:rPr lang="fr-FR" smtClean="0"/>
+              <a:rPr lang="fr-FR"/>
               <a:t>Modifiez le style du titre</a:t>
             </a:r>
             <a:endParaRPr lang="en-US" dirty="0"/>
@@ -3046,35 +3042,35 @@
           <a:p>
             <a:pPr lvl="0"/>
             <a:r>
-              <a:rPr lang="fr-FR" smtClean="0"/>
+              <a:rPr lang="fr-FR"/>
               <a:t>Modifiez les styles du texte du masque</a:t>
             </a:r>
           </a:p>
           <a:p>
             <a:pPr lvl="1"/>
             <a:r>
-              <a:rPr lang="fr-FR" smtClean="0"/>
+              <a:rPr lang="fr-FR"/>
               <a:t>Deuxième niveau</a:t>
             </a:r>
           </a:p>
           <a:p>
             <a:pPr lvl="2"/>
             <a:r>
-              <a:rPr lang="fr-FR" smtClean="0"/>
+              <a:rPr lang="fr-FR"/>
               <a:t>Troisième niveau</a:t>
             </a:r>
           </a:p>
           <a:p>
             <a:pPr lvl="3"/>
             <a:r>
-              <a:rPr lang="fr-FR" smtClean="0"/>
+              <a:rPr lang="fr-FR"/>
               <a:t>Quatrième niveau</a:t>
             </a:r>
           </a:p>
           <a:p>
             <a:pPr lvl="4"/>
             <a:r>
-              <a:rPr lang="fr-FR" smtClean="0"/>
+              <a:rPr lang="fr-FR"/>
               <a:t>Cinquième niveau</a:t>
             </a:r>
             <a:endParaRPr lang="en-US" dirty="0"/>
@@ -3197,7 +3193,7 @@
           <a:lstStyle/>
           <a:p>
             <a:r>
-              <a:rPr lang="fr-FR" smtClean="0"/>
+              <a:rPr lang="fr-FR"/>
               <a:t>Modifiez le style du titre</a:t>
             </a:r>
             <a:endParaRPr lang="en-US" dirty="0"/>
@@ -3226,35 +3222,35 @@
           <a:p>
             <a:pPr lvl="0"/>
             <a:r>
-              <a:rPr lang="fr-FR" smtClean="0"/>
+              <a:rPr lang="fr-FR"/>
               <a:t>Modifiez les styles du texte du masque</a:t>
             </a:r>
           </a:p>
           <a:p>
             <a:pPr lvl="1"/>
             <a:r>
-              <a:rPr lang="fr-FR" smtClean="0"/>
+              <a:rPr lang="fr-FR"/>
               <a:t>Deuxième niveau</a:t>
             </a:r>
           </a:p>
           <a:p>
             <a:pPr lvl="2"/>
             <a:r>
-              <a:rPr lang="fr-FR" smtClean="0"/>
+              <a:rPr lang="fr-FR"/>
               <a:t>Troisième niveau</a:t>
             </a:r>
           </a:p>
           <a:p>
             <a:pPr lvl="3"/>
             <a:r>
-              <a:rPr lang="fr-FR" smtClean="0"/>
+              <a:rPr lang="fr-FR"/>
               <a:t>Quatrième niveau</a:t>
             </a:r>
           </a:p>
           <a:p>
             <a:pPr lvl="4"/>
             <a:r>
-              <a:rPr lang="fr-FR" smtClean="0"/>
+              <a:rPr lang="fr-FR"/>
               <a:t>Cinquième niveau</a:t>
             </a:r>
             <a:endParaRPr lang="en-US" dirty="0"/>
@@ -3372,7 +3368,7 @@
           <a:lstStyle/>
           <a:p>
             <a:r>
-              <a:rPr lang="fr-FR" smtClean="0"/>
+              <a:rPr lang="fr-FR"/>
               <a:t>Modifiez le style du titre</a:t>
             </a:r>
             <a:endParaRPr lang="en-US" dirty="0"/>
@@ -3396,35 +3392,35 @@
           <a:p>
             <a:pPr lvl="0"/>
             <a:r>
-              <a:rPr lang="fr-FR" smtClean="0"/>
+              <a:rPr lang="fr-FR"/>
               <a:t>Modifiez les styles du texte du masque</a:t>
             </a:r>
           </a:p>
           <a:p>
             <a:pPr lvl="1"/>
             <a:r>
-              <a:rPr lang="fr-FR" smtClean="0"/>
+              <a:rPr lang="fr-FR"/>
               <a:t>Deuxième niveau</a:t>
             </a:r>
           </a:p>
           <a:p>
             <a:pPr lvl="2"/>
             <a:r>
-              <a:rPr lang="fr-FR" smtClean="0"/>
+              <a:rPr lang="fr-FR"/>
               <a:t>Troisième niveau</a:t>
             </a:r>
           </a:p>
           <a:p>
             <a:pPr lvl="3"/>
             <a:r>
-              <a:rPr lang="fr-FR" smtClean="0"/>
+              <a:rPr lang="fr-FR"/>
               <a:t>Quatrième niveau</a:t>
             </a:r>
           </a:p>
           <a:p>
             <a:pPr lvl="4"/>
             <a:r>
-              <a:rPr lang="fr-FR" smtClean="0"/>
+              <a:rPr lang="fr-FR"/>
               <a:t>Cinquième niveau</a:t>
             </a:r>
             <a:endParaRPr lang="en-US" dirty="0"/>
@@ -3553,7 +3549,7 @@
           </a:lstStyle>
           <a:p>
             <a:r>
-              <a:rPr lang="fr-FR" smtClean="0"/>
+              <a:rPr lang="fr-FR"/>
               <a:t>Modifiez le style du titre</a:t>
             </a:r>
             <a:endParaRPr lang="en-US" dirty="0"/>
@@ -3675,7 +3671,7 @@
           <a:p>
             <a:pPr lvl="0"/>
             <a:r>
-              <a:rPr lang="fr-FR" smtClean="0"/>
+              <a:rPr lang="fr-FR"/>
               <a:t>Modifiez les styles du texte du masque</a:t>
             </a:r>
           </a:p>
@@ -3792,7 +3788,7 @@
           <a:lstStyle/>
           <a:p>
             <a:r>
-              <a:rPr lang="fr-FR" smtClean="0"/>
+              <a:rPr lang="fr-FR"/>
               <a:t>Modifiez le style du titre</a:t>
             </a:r>
             <a:endParaRPr lang="en-US" dirty="0"/>
@@ -3823,35 +3819,35 @@
           <a:p>
             <a:pPr lvl="0"/>
             <a:r>
-              <a:rPr lang="fr-FR" smtClean="0"/>
+              <a:rPr lang="fr-FR"/>
               <a:t>Modifiez les styles du texte du masque</a:t>
             </a:r>
           </a:p>
           <a:p>
             <a:pPr lvl="1"/>
             <a:r>
-              <a:rPr lang="fr-FR" smtClean="0"/>
+              <a:rPr lang="fr-FR"/>
               <a:t>Deuxième niveau</a:t>
             </a:r>
           </a:p>
           <a:p>
             <a:pPr lvl="2"/>
             <a:r>
-              <a:rPr lang="fr-FR" smtClean="0"/>
+              <a:rPr lang="fr-FR"/>
               <a:t>Troisième niveau</a:t>
             </a:r>
           </a:p>
           <a:p>
             <a:pPr lvl="3"/>
             <a:r>
-              <a:rPr lang="fr-FR" smtClean="0"/>
+              <a:rPr lang="fr-FR"/>
               <a:t>Quatrième niveau</a:t>
             </a:r>
           </a:p>
           <a:p>
             <a:pPr lvl="4"/>
             <a:r>
-              <a:rPr lang="fr-FR" smtClean="0"/>
+              <a:rPr lang="fr-FR"/>
               <a:t>Cinquième niveau</a:t>
             </a:r>
             <a:endParaRPr lang="en-US" dirty="0"/>
@@ -3882,35 +3878,35 @@
           <a:p>
             <a:pPr lvl="0"/>
             <a:r>
-              <a:rPr lang="fr-FR" smtClean="0"/>
+              <a:rPr lang="fr-FR"/>
               <a:t>Modifiez les styles du texte du masque</a:t>
             </a:r>
           </a:p>
           <a:p>
             <a:pPr lvl="1"/>
             <a:r>
-              <a:rPr lang="fr-FR" smtClean="0"/>
+              <a:rPr lang="fr-FR"/>
               <a:t>Deuxième niveau</a:t>
             </a:r>
           </a:p>
           <a:p>
             <a:pPr lvl="2"/>
             <a:r>
-              <a:rPr lang="fr-FR" smtClean="0"/>
+              <a:rPr lang="fr-FR"/>
               <a:t>Troisième niveau</a:t>
             </a:r>
           </a:p>
           <a:p>
             <a:pPr lvl="3"/>
             <a:r>
-              <a:rPr lang="fr-FR" smtClean="0"/>
+              <a:rPr lang="fr-FR"/>
               <a:t>Quatrième niveau</a:t>
             </a:r>
           </a:p>
           <a:p>
             <a:pPr lvl="4"/>
             <a:r>
-              <a:rPr lang="fr-FR" smtClean="0"/>
+              <a:rPr lang="fr-FR"/>
               <a:t>Cinquième niveau</a:t>
             </a:r>
             <a:endParaRPr lang="en-US" dirty="0"/>
@@ -4032,7 +4028,7 @@
           </a:lstStyle>
           <a:p>
             <a:r>
-              <a:rPr lang="fr-FR" smtClean="0"/>
+              <a:rPr lang="fr-FR"/>
               <a:t>Modifiez le style du titre</a:t>
             </a:r>
             <a:endParaRPr lang="en-US" dirty="0"/>
@@ -4104,7 +4100,7 @@
           <a:p>
             <a:pPr lvl="0"/>
             <a:r>
-              <a:rPr lang="fr-FR" smtClean="0"/>
+              <a:rPr lang="fr-FR"/>
               <a:t>Modifiez les styles du texte du masque</a:t>
             </a:r>
           </a:p>
@@ -4134,35 +4130,35 @@
           <a:p>
             <a:pPr lvl="0"/>
             <a:r>
-              <a:rPr lang="fr-FR" smtClean="0"/>
+              <a:rPr lang="fr-FR"/>
               <a:t>Modifiez les styles du texte du masque</a:t>
             </a:r>
           </a:p>
           <a:p>
             <a:pPr lvl="1"/>
             <a:r>
-              <a:rPr lang="fr-FR" smtClean="0"/>
+              <a:rPr lang="fr-FR"/>
               <a:t>Deuxième niveau</a:t>
             </a:r>
           </a:p>
           <a:p>
             <a:pPr lvl="2"/>
             <a:r>
-              <a:rPr lang="fr-FR" smtClean="0"/>
+              <a:rPr lang="fr-FR"/>
               <a:t>Troisième niveau</a:t>
             </a:r>
           </a:p>
           <a:p>
             <a:pPr lvl="3"/>
             <a:r>
-              <a:rPr lang="fr-FR" smtClean="0"/>
+              <a:rPr lang="fr-FR"/>
               <a:t>Quatrième niveau</a:t>
             </a:r>
           </a:p>
           <a:p>
             <a:pPr lvl="4"/>
             <a:r>
-              <a:rPr lang="fr-FR" smtClean="0"/>
+              <a:rPr lang="fr-FR"/>
               <a:t>Cinquième niveau</a:t>
             </a:r>
             <a:endParaRPr lang="en-US" dirty="0"/>
@@ -4234,7 +4230,7 @@
           <a:p>
             <a:pPr lvl="0"/>
             <a:r>
-              <a:rPr lang="fr-FR" smtClean="0"/>
+              <a:rPr lang="fr-FR"/>
               <a:t>Modifiez les styles du texte du masque</a:t>
             </a:r>
           </a:p>
@@ -4264,35 +4260,35 @@
           <a:p>
             <a:pPr lvl="0"/>
             <a:r>
-              <a:rPr lang="fr-FR" smtClean="0"/>
+              <a:rPr lang="fr-FR"/>
               <a:t>Modifiez les styles du texte du masque</a:t>
             </a:r>
           </a:p>
           <a:p>
             <a:pPr lvl="1"/>
             <a:r>
-              <a:rPr lang="fr-FR" smtClean="0"/>
+              <a:rPr lang="fr-FR"/>
               <a:t>Deuxième niveau</a:t>
             </a:r>
           </a:p>
           <a:p>
             <a:pPr lvl="2"/>
             <a:r>
-              <a:rPr lang="fr-FR" smtClean="0"/>
+              <a:rPr lang="fr-FR"/>
               <a:t>Troisième niveau</a:t>
             </a:r>
           </a:p>
           <a:p>
             <a:pPr lvl="3"/>
             <a:r>
-              <a:rPr lang="fr-FR" smtClean="0"/>
+              <a:rPr lang="fr-FR"/>
               <a:t>Quatrième niveau</a:t>
             </a:r>
           </a:p>
           <a:p>
             <a:pPr lvl="4"/>
             <a:r>
-              <a:rPr lang="fr-FR" smtClean="0"/>
+              <a:rPr lang="fr-FR"/>
               <a:t>Cinquième niveau</a:t>
             </a:r>
             <a:endParaRPr lang="en-US" dirty="0"/>
@@ -4410,7 +4406,7 @@
           <a:lstStyle/>
           <a:p>
             <a:r>
-              <a:rPr lang="fr-FR" smtClean="0"/>
+              <a:rPr lang="fr-FR"/>
               <a:t>Modifiez le style du titre</a:t>
             </a:r>
             <a:endParaRPr lang="en-US" dirty="0"/>
@@ -4634,7 +4630,7 @@
           </a:lstStyle>
           <a:p>
             <a:r>
-              <a:rPr lang="fr-FR" smtClean="0"/>
+              <a:rPr lang="fr-FR"/>
               <a:t>Modifiez le style du titre</a:t>
             </a:r>
             <a:endParaRPr lang="en-US" dirty="0"/>
@@ -4665,35 +4661,35 @@
           <a:p>
             <a:pPr lvl="0"/>
             <a:r>
-              <a:rPr lang="fr-FR" smtClean="0"/>
+              <a:rPr lang="fr-FR"/>
               <a:t>Modifiez les styles du texte du masque</a:t>
             </a:r>
           </a:p>
           <a:p>
             <a:pPr lvl="1"/>
             <a:r>
-              <a:rPr lang="fr-FR" smtClean="0"/>
+              <a:rPr lang="fr-FR"/>
               <a:t>Deuxième niveau</a:t>
             </a:r>
           </a:p>
           <a:p>
             <a:pPr lvl="2"/>
             <a:r>
-              <a:rPr lang="fr-FR" smtClean="0"/>
+              <a:rPr lang="fr-FR"/>
               <a:t>Troisième niveau</a:t>
             </a:r>
           </a:p>
           <a:p>
             <a:pPr lvl="3"/>
             <a:r>
-              <a:rPr lang="fr-FR" smtClean="0"/>
+              <a:rPr lang="fr-FR"/>
               <a:t>Quatrième niveau</a:t>
             </a:r>
           </a:p>
           <a:p>
             <a:pPr lvl="4"/>
             <a:r>
-              <a:rPr lang="fr-FR" smtClean="0"/>
+              <a:rPr lang="fr-FR"/>
               <a:t>Cinquième niveau</a:t>
             </a:r>
             <a:endParaRPr lang="en-US" dirty="0"/>
@@ -4761,7 +4757,7 @@
           <a:p>
             <a:pPr lvl="0"/>
             <a:r>
-              <a:rPr lang="fr-FR" smtClean="0"/>
+              <a:rPr lang="fr-FR"/>
               <a:t>Modifiez les styles du texte du masque</a:t>
             </a:r>
           </a:p>
@@ -4889,7 +4885,7 @@
           </a:lstStyle>
           <a:p>
             <a:r>
-              <a:rPr lang="fr-FR" smtClean="0"/>
+              <a:rPr lang="fr-FR"/>
               <a:t>Modifiez le style du titre</a:t>
             </a:r>
             <a:endParaRPr lang="en-US" dirty="0"/>
@@ -4976,7 +4972,7 @@
           </a:lstStyle>
           <a:p>
             <a:r>
-              <a:rPr lang="fr-FR" smtClean="0"/>
+              <a:rPr lang="fr-FR"/>
               <a:t>Cliquez sur l'icône pour ajouter une image</a:t>
             </a:r>
             <a:endParaRPr lang="en-US" dirty="0"/>
@@ -5044,7 +5040,7 @@
           <a:p>
             <a:pPr lvl="0"/>
             <a:r>
-              <a:rPr lang="fr-FR" smtClean="0"/>
+              <a:rPr lang="fr-FR"/>
               <a:t>Modifiez les styles du texte du masque</a:t>
             </a:r>
           </a:p>
@@ -5367,7 +5363,7 @@
           <a:lstStyle/>
           <a:p>
             <a:r>
-              <a:rPr lang="fr-FR" smtClean="0"/>
+              <a:rPr lang="fr-FR"/>
               <a:t>Modifiez le style du titre</a:t>
             </a:r>
             <a:endParaRPr lang="en-US" dirty="0"/>
@@ -5401,35 +5397,35 @@
           <a:p>
             <a:pPr lvl="0"/>
             <a:r>
-              <a:rPr lang="fr-FR" smtClean="0"/>
+              <a:rPr lang="fr-FR"/>
               <a:t>Modifiez les styles du texte du masque</a:t>
             </a:r>
           </a:p>
           <a:p>
             <a:pPr lvl="1"/>
             <a:r>
-              <a:rPr lang="fr-FR" smtClean="0"/>
+              <a:rPr lang="fr-FR"/>
               <a:t>Deuxième niveau</a:t>
             </a:r>
           </a:p>
           <a:p>
             <a:pPr lvl="2"/>
             <a:r>
-              <a:rPr lang="fr-FR" smtClean="0"/>
+              <a:rPr lang="fr-FR"/>
               <a:t>Troisième niveau</a:t>
             </a:r>
           </a:p>
           <a:p>
             <a:pPr lvl="3"/>
             <a:r>
-              <a:rPr lang="fr-FR" smtClean="0"/>
+              <a:rPr lang="fr-FR"/>
               <a:t>Quatrième niveau</a:t>
             </a:r>
           </a:p>
           <a:p>
             <a:pPr lvl="4"/>
             <a:r>
-              <a:rPr lang="fr-FR" smtClean="0"/>
+              <a:rPr lang="fr-FR"/>
               <a:t>Cinquième niveau</a:t>
             </a:r>
             <a:endParaRPr lang="en-US" dirty="0"/>
@@ -6072,39 +6068,19 @@
           <a:p>
             <a:pPr algn="ctr"/>
             <a:r>
-              <a:rPr lang="fr-FR" sz="3200" b="1" dirty="0" smtClean="0">
+              <a:rPr lang="fr-FR" sz="3200" b="1" dirty="0">
                 <a:solidFill>
                   <a:srgbClr val="0070C0"/>
                 </a:solidFill>
               </a:rPr>
-              <a:t>INTELLIGENT </a:t>
-            </a:r>
-            <a:r>
-              <a:rPr lang="fr-FR" sz="3200" b="1" dirty="0">
-                <a:solidFill>
-                  <a:srgbClr val="0070C0"/>
-                </a:solidFill>
-              </a:rPr>
-              <a:t>ENGINE FOR HOUSES PRICES ESTIMATION</a:t>
-            </a:r>
-            <a:r>
-              <a:rPr lang="fr-FR" dirty="0"/>
-              <a:t/>
+              <a:t>INTELLIGENT ENGINE FOR HOUSES PRICES ESTIMATION</a:t>
             </a:r>
             <a:br>
               <a:rPr lang="fr-FR" dirty="0"/>
             </a:br>
-            <a:r>
-              <a:rPr lang="fr-FR" dirty="0"/>
-              <a:t/>
-            </a:r>
             <a:br>
               <a:rPr lang="fr-FR" dirty="0"/>
             </a:br>
-            <a:r>
-              <a:rPr lang="fr-FR" dirty="0"/>
-              <a:t/>
-            </a:r>
             <a:br>
               <a:rPr lang="fr-FR" dirty="0"/>
             </a:br>
@@ -6133,17 +6109,6 @@
             <a:normAutofit/>
           </a:bodyPr>
           <a:lstStyle/>
-          <a:p>
-            <a:pPr algn="ctr"/>
-            <a:endParaRPr lang="fr-FR" dirty="0" smtClean="0">
-              <a:solidFill>
-                <a:schemeClr val="tx1">
-                  <a:lumMod val="65000"/>
-                  <a:lumOff val="35000"/>
-                </a:schemeClr>
-              </a:solidFill>
-            </a:endParaRPr>
-          </a:p>
           <a:p>
             <a:pPr algn="ctr"/>
             <a:endParaRPr lang="fr-FR" dirty="0">
@@ -6157,8 +6122,19 @@
           </a:p>
           <a:p>
             <a:pPr algn="ctr"/>
-            <a:r>
-              <a:rPr lang="fr-FR" dirty="0" smtClean="0">
+            <a:endParaRPr lang="fr-FR" dirty="0">
+              <a:solidFill>
+                <a:schemeClr val="tx1">
+                  <a:lumMod val="65000"/>
+                  <a:lumOff val="35000"/>
+                </a:schemeClr>
+              </a:solidFill>
+            </a:endParaRPr>
+          </a:p>
+          <a:p>
+            <a:pPr algn="ctr"/>
+            <a:r>
+              <a:rPr lang="fr-FR" dirty="0">
                 <a:solidFill>
                   <a:schemeClr val="tx1">
                     <a:lumMod val="65000"/>
@@ -6166,18 +6142,7 @@
                   </a:schemeClr>
                 </a:solidFill>
               </a:rPr>
-              <a:t>Master </a:t>
-            </a:r>
-            <a:r>
-              <a:rPr lang="fr-FR" dirty="0">
-                <a:solidFill>
-                  <a:schemeClr val="tx1">
-                    <a:lumMod val="65000"/>
-                    <a:lumOff val="35000"/>
-                  </a:schemeClr>
-                </a:solidFill>
-              </a:rPr>
-              <a:t>in Artificial Intelligence</a:t>
+              <a:t>Master in Artificial Intelligence</a:t>
             </a:r>
             <a:br>
               <a:rPr lang="fr-FR" dirty="0">
@@ -6212,7 +6177,7 @@
           <p:nvPr/>
         </p:nvPicPr>
         <p:blipFill>
-          <a:blip r:embed="rId2">
+          <a:blip r:embed="rId3">
             <a:extLst>
               <a:ext uri="{28A0092B-C50C-407E-A947-70E740481C1C}">
                 <a14:useLocalDpi xmlns:a14="http://schemas.microsoft.com/office/drawing/2010/main" val="0"/>
@@ -6253,7 +6218,7 @@
         <p:spPr>
           <a:xfrm>
             <a:off x="919891" y="5650069"/>
-            <a:ext cx="6603653" cy="646331"/>
+            <a:ext cx="6603653" cy="369332"/>
           </a:xfrm>
           <a:prstGeom prst="rect">
             <a:avLst/>
@@ -6267,21 +6232,13 @@
           <a:lstStyle/>
           <a:p>
             <a:r>
-              <a:rPr lang="fr-CH" dirty="0" smtClean="0"/>
+              <a:rPr lang="fr-CH" dirty="0"/>
               <a:t>Authors: </a:t>
             </a:r>
             <a:r>
               <a:rPr lang="fr-FR" dirty="0"/>
-              <a:t>Arthur CHERUBINI and Michelle Vanessa </a:t>
-            </a:r>
-            <a:r>
-              <a:rPr lang="fr-FR" dirty="0" smtClean="0"/>
-              <a:t>MEGUEP</a:t>
-            </a:r>
-            <a:endParaRPr lang="fr-FR" dirty="0"/>
-          </a:p>
-          <a:p>
-            <a:endParaRPr lang="fr-FR" dirty="0"/>
+              <a:t>Michelle Vanessa MEGUEP and Arthur CHERUBINI </a:t>
+            </a:r>
           </a:p>
         </p:txBody>
       </p:sp>
@@ -6295,13 +6252,6 @@
   <p:clrMapOvr>
     <a:masterClrMapping/>
   </p:clrMapOvr>
-  <p:timing>
-    <p:tnLst>
-      <p:par>
-        <p:cTn id="1" dur="indefinite" restart="never" nodeType="tmRoot"/>
-      </p:par>
-    </p:tnLst>
-  </p:timing>
 </p:sld>
 </file>
 
@@ -6343,7 +6293,7 @@
           <a:lstStyle/>
           <a:p>
             <a:r>
-              <a:rPr lang="fr-CH" b="1" dirty="0" smtClean="0">
+              <a:rPr lang="fr-CH" b="1" dirty="0">
                 <a:solidFill>
                   <a:schemeClr val="bg1"/>
                 </a:solidFill>
@@ -6366,8 +6316,8 @@
         </p:nvSpPr>
         <p:spPr>
           <a:xfrm>
-            <a:off x="1435261" y="1920110"/>
-            <a:ext cx="8125428" cy="3970318"/>
+            <a:off x="1435261" y="2108646"/>
+            <a:ext cx="8125428" cy="3139321"/>
           </a:xfrm>
           <a:prstGeom prst="rect">
             <a:avLst/>
@@ -6385,7 +6335,7 @@
               <a:buChar char="q"/>
             </a:pPr>
             <a:r>
-              <a:rPr lang="fr-CH" dirty="0" smtClean="0"/>
+              <a:rPr lang="fr-CH" dirty="0"/>
               <a:t>About the project: </a:t>
             </a:r>
           </a:p>
@@ -6395,7 +6345,7 @@
               <a:buChar char="q"/>
             </a:pPr>
             <a:r>
-              <a:rPr lang="fr-CH" dirty="0" smtClean="0"/>
+              <a:rPr lang="fr-CH" dirty="0"/>
               <a:t>Description, goals, hypotheses defined</a:t>
             </a:r>
           </a:p>
@@ -6405,7 +6355,7 @@
               <a:buChar char="q"/>
             </a:pPr>
             <a:r>
-              <a:rPr lang="fr-CH" dirty="0" smtClean="0"/>
+              <a:rPr lang="fr-CH" dirty="0"/>
               <a:t>The database used and the work on the data</a:t>
             </a:r>
           </a:p>
@@ -6415,7 +6365,7 @@
               <a:buChar char="q"/>
             </a:pPr>
             <a:r>
-              <a:rPr lang="fr-CH" dirty="0" smtClean="0"/>
+              <a:rPr lang="fr-CH" dirty="0"/>
               <a:t>The algorithms</a:t>
             </a:r>
           </a:p>
@@ -6424,7 +6374,11 @@
               <a:buFont typeface="Wingdings" panose="05000000000000000000" pitchFamily="2" charset="2"/>
               <a:buChar char="q"/>
             </a:pPr>
-            <a:endParaRPr lang="fr-CH" dirty="0" smtClean="0"/>
+            <a:endParaRPr lang="fr-CH" dirty="0"/>
+          </a:p>
+          <a:p>
+            <a:pPr lvl="1"/>
+            <a:endParaRPr lang="fr-CH" dirty="0"/>
           </a:p>
           <a:p>
             <a:pPr marL="285750" indent="-285750">
@@ -6432,8 +6386,8 @@
               <a:buChar char="q"/>
             </a:pPr>
             <a:r>
-              <a:rPr lang="fr-CH" dirty="0" smtClean="0"/>
-              <a:t>The project organisation</a:t>
+              <a:rPr lang="fr-CH" dirty="0"/>
+              <a:t>The project reproducibility</a:t>
             </a:r>
           </a:p>
           <a:p>
@@ -6443,22 +6397,16 @@
             </a:pPr>
             <a:r>
               <a:rPr lang="fr-CH" dirty="0"/>
-              <a:t>The work sharing and contribution</a:t>
-            </a:r>
-          </a:p>
-          <a:p>
-            <a:pPr marL="742950" lvl="1" indent="-285750">
-              <a:buFont typeface="Wingdings" panose="05000000000000000000" pitchFamily="2" charset="2"/>
-              <a:buChar char="q"/>
-            </a:pPr>
-            <a:r>
-              <a:rPr lang="fr-CH" dirty="0" smtClean="0"/>
-              <a:t>The collaboration between the team members</a:t>
+              <a:t>What has been put in place or planned?</a:t>
             </a:r>
           </a:p>
           <a:p>
             <a:pPr lvl="1"/>
-            <a:endParaRPr lang="fr-CH" dirty="0" smtClean="0"/>
+            <a:endParaRPr lang="fr-CH" dirty="0"/>
+          </a:p>
+          <a:p>
+            <a:pPr lvl="1"/>
+            <a:endParaRPr lang="fr-CH" dirty="0"/>
           </a:p>
           <a:p>
             <a:pPr marL="285750" indent="-285750">
@@ -6467,38 +6415,6 @@
             </a:pPr>
             <a:r>
               <a:rPr lang="fr-CH" dirty="0"/>
-              <a:t>T</a:t>
-            </a:r>
-            <a:r>
-              <a:rPr lang="fr-CH" dirty="0" smtClean="0"/>
-              <a:t>he project reproducibility</a:t>
-            </a:r>
-          </a:p>
-          <a:p>
-            <a:pPr marL="742950" lvl="1" indent="-285750">
-              <a:buFont typeface="Wingdings" panose="05000000000000000000" pitchFamily="2" charset="2"/>
-              <a:buChar char="q"/>
-            </a:pPr>
-            <a:r>
-              <a:rPr lang="fr-CH" dirty="0" smtClean="0"/>
-              <a:t>What has been put in place or planned?</a:t>
-            </a:r>
-          </a:p>
-          <a:p>
-            <a:pPr lvl="1"/>
-            <a:endParaRPr lang="fr-CH" dirty="0" smtClean="0"/>
-          </a:p>
-          <a:p>
-            <a:pPr lvl="1"/>
-            <a:endParaRPr lang="fr-CH" dirty="0" smtClean="0"/>
-          </a:p>
-          <a:p>
-            <a:pPr marL="285750" indent="-285750">
-              <a:buFont typeface="Wingdings" panose="05000000000000000000" pitchFamily="2" charset="2"/>
-              <a:buChar char="q"/>
-            </a:pPr>
-            <a:r>
-              <a:rPr lang="fr-CH" dirty="0" smtClean="0"/>
               <a:t>Project status(Demo) and next steps</a:t>
             </a:r>
             <a:endParaRPr lang="fr-FR" dirty="0"/>
@@ -6515,13 +6431,6 @@
   <p:clrMapOvr>
     <a:masterClrMapping/>
   </p:clrMapOvr>
-  <p:timing>
-    <p:tnLst>
-      <p:par>
-        <p:cTn id="1" dur="indefinite" restart="never" nodeType="tmRoot"/>
-      </p:par>
-    </p:tnLst>
-  </p:timing>
 </p:sld>
 </file>
 
@@ -6564,7 +6473,7 @@
           <a:p>
             <a:pPr algn="ctr"/>
             <a:r>
-              <a:rPr lang="fr-CH" b="1" dirty="0" smtClean="0">
+              <a:rPr lang="fr-CH" b="1" dirty="0">
                 <a:solidFill>
                   <a:schemeClr val="accent1"/>
                 </a:solidFill>
@@ -6602,27 +6511,15 @@
           <a:p>
             <a:r>
               <a:rPr lang="en-US" dirty="0"/>
-              <a:t>Predicting the house price is a well-known problem in the field of machine learning. one of the best-known projects on </a:t>
-            </a:r>
-            <a:r>
-              <a:rPr lang="en-US" dirty="0" smtClean="0"/>
-              <a:t>this is </a:t>
-            </a:r>
-            <a:r>
-              <a:rPr lang="en-US" dirty="0"/>
-              <a:t>the Boston House </a:t>
-            </a:r>
-            <a:r>
-              <a:rPr lang="en-US" dirty="0" smtClean="0"/>
-              <a:t>prices.</a:t>
-            </a:r>
-          </a:p>
-          <a:p>
-            <a:endParaRPr lang="en-US" dirty="0" smtClean="0"/>
-          </a:p>
-          <a:p>
-            <a:r>
-              <a:rPr lang="en-US" b="1" dirty="0" smtClean="0"/>
+              <a:t>Predicting the house price is a well-known problem in the field of machine learning. One of the best-known projects on this is the Boston House prices.</a:t>
+            </a:r>
+          </a:p>
+          <a:p>
+            <a:endParaRPr lang="en-US" dirty="0"/>
+          </a:p>
+          <a:p>
+            <a:r>
+              <a:rPr lang="en-US" b="1" dirty="0"/>
               <a:t>The objectives of this project:</a:t>
             </a:r>
           </a:p>
@@ -6632,7 +6529,7 @@
               <a:buChar char="Ø"/>
             </a:pPr>
             <a:r>
-              <a:rPr lang="en-US" dirty="0" smtClean="0"/>
+              <a:rPr lang="en-US" dirty="0"/>
               <a:t>Find the most relevant features which determine houses prices</a:t>
             </a:r>
           </a:p>
@@ -6642,16 +6539,16 @@
               <a:buChar char="Ø"/>
             </a:pPr>
             <a:r>
-              <a:rPr lang="en-US" dirty="0" smtClean="0"/>
+              <a:rPr lang="en-US" dirty="0"/>
               <a:t>Apply differents algorithms and find the one with the best prediction performance</a:t>
             </a:r>
           </a:p>
           <a:p>
-            <a:endParaRPr lang="en-US" dirty="0" smtClean="0"/>
-          </a:p>
-          <a:p>
-            <a:r>
-              <a:rPr lang="en-US" b="1" dirty="0" smtClean="0"/>
+            <a:endParaRPr lang="en-US" dirty="0"/>
+          </a:p>
+          <a:p>
+            <a:r>
+              <a:rPr lang="en-US" b="1" dirty="0"/>
               <a:t>Two hypothesis defined:</a:t>
             </a:r>
           </a:p>
@@ -6661,7 +6558,7 @@
               <a:buChar char="Ø"/>
             </a:pPr>
             <a:r>
-              <a:rPr lang="en-US" dirty="0" smtClean="0"/>
+              <a:rPr lang="en-US" dirty="0"/>
               <a:t>Between all the house features, only some are relevant in the price prediction</a:t>
             </a:r>
           </a:p>
@@ -6671,16 +6568,8 @@
               <a:buChar char="Ø"/>
             </a:pPr>
             <a:r>
-              <a:rPr lang="en-US" dirty="0" smtClean="0"/>
-              <a:t>One algorithm between the linear regression, decision tree and random forest can predict with </a:t>
-            </a:r>
-            <a:r>
               <a:rPr lang="en-US" dirty="0"/>
-              <a:t>good accuracy the price of a </a:t>
-            </a:r>
-            <a:r>
-              <a:rPr lang="en-US" dirty="0" smtClean="0"/>
-              <a:t>property</a:t>
+              <a:t>One algorithm between the linear regression, decision tree and random forest can predict with good accuracy the price of a property</a:t>
             </a:r>
           </a:p>
           <a:p>
@@ -6704,24 +6593,15 @@
           </a:p>
           <a:p>
             <a:r>
-              <a:rPr lang="en-US" dirty="0" smtClean="0"/>
-              <a:t>2930 </a:t>
-            </a:r>
-            <a:r>
               <a:rPr lang="en-US" dirty="0"/>
-              <a:t>observations and 80 </a:t>
-            </a:r>
-            <a:r>
-              <a:rPr lang="en-US" dirty="0" smtClean="0"/>
-              <a:t>features of type categorical and discrete/continuous</a:t>
-            </a:r>
+              <a:t>2930 observations and 80 features which can be categorical or discrete/continuous</a:t>
+            </a:r>
+          </a:p>
+          <a:p>
             <a:endParaRPr lang="en-US" dirty="0"/>
           </a:p>
           <a:p>
-            <a:endParaRPr lang="en-US" dirty="0"/>
-          </a:p>
-          <a:p>
-            <a:endParaRPr lang="en-US" b="1" dirty="0" smtClean="0"/>
+            <a:endParaRPr lang="en-US" b="1" dirty="0"/>
           </a:p>
           <a:p>
             <a:pPr marL="285750" indent="-285750">
@@ -6758,7 +6638,7 @@
         </p:blipFill>
         <p:spPr bwMode="auto">
           <a:xfrm>
-            <a:off x="240486" y="4442556"/>
+            <a:off x="240486" y="4810201"/>
             <a:ext cx="604495" cy="886834"/>
           </a:xfrm>
           <a:prstGeom prst="rect">
@@ -6799,7 +6679,7 @@
         </p:blipFill>
         <p:spPr bwMode="auto">
           <a:xfrm>
-            <a:off x="0" y="2710933"/>
+            <a:off x="0" y="2886266"/>
             <a:ext cx="1085468" cy="1085468"/>
           </a:xfrm>
           <a:prstGeom prst="rect">
@@ -6827,13 +6707,6 @@
   <p:clrMapOvr>
     <a:masterClrMapping/>
   </p:clrMapOvr>
-  <p:timing>
-    <p:tnLst>
-      <p:par>
-        <p:cTn id="1" dur="indefinite" restart="never" nodeType="tmRoot"/>
-      </p:par>
-    </p:tnLst>
-  </p:timing>
 </p:sld>
 </file>
 
@@ -6856,269 +6729,10 @@
       </p:grpSpPr>
       <p:sp>
         <p:nvSpPr>
-          <p:cNvPr id="2" name="Titre 1"/>
-          <p:cNvSpPr>
-            <a:spLocks noGrp="1"/>
-          </p:cNvSpPr>
-          <p:nvPr>
-            <p:ph type="title"/>
-          </p:nvPr>
-        </p:nvSpPr>
-        <p:spPr>
-          <a:xfrm>
-            <a:off x="2223645" y="544009"/>
-            <a:ext cx="8534401" cy="914401"/>
-          </a:xfrm>
-        </p:spPr>
-        <p:txBody>
-          <a:bodyPr>
-            <a:normAutofit fontScale="90000"/>
-          </a:bodyPr>
-          <a:lstStyle/>
-          <a:p>
-            <a:pPr algn="ctr"/>
-            <a:r>
-              <a:rPr lang="fr-CH" b="1" dirty="0" smtClean="0">
-                <a:solidFill>
-                  <a:schemeClr val="accent1"/>
-                </a:solidFill>
-              </a:rPr>
-              <a:t>THE PROJECT Organisation</a:t>
-            </a:r>
-            <a:r>
-              <a:rPr lang="fr-CH" dirty="0">
-                <a:solidFill>
-                  <a:schemeClr val="bg1"/>
-                </a:solidFill>
-              </a:rPr>
-              <a:t/>
-            </a:r>
-            <a:br>
-              <a:rPr lang="fr-CH" dirty="0">
-                <a:solidFill>
-                  <a:schemeClr val="bg1"/>
-                </a:solidFill>
-              </a:rPr>
-            </a:br>
-            <a:endParaRPr lang="fr-FR" dirty="0">
-              <a:solidFill>
-                <a:schemeClr val="bg1"/>
-              </a:solidFill>
-            </a:endParaRPr>
-          </a:p>
-        </p:txBody>
-      </p:sp>
-      <p:pic>
-        <p:nvPicPr>
-          <p:cNvPr id="4098" name="Picture 2" descr="GitHub Project Management Tutorial - Setup GitHub Projects &amp; Automations -  YouTube"/>
-          <p:cNvPicPr>
-            <a:picLocks noChangeAspect="1" noChangeArrowheads="1"/>
-          </p:cNvPicPr>
-          <p:nvPr/>
-        </p:nvPicPr>
-        <p:blipFill>
-          <a:blip r:embed="rId2">
-            <a:extLst>
-              <a:ext uri="{28A0092B-C50C-407E-A947-70E740481C1C}">
-                <a14:useLocalDpi xmlns:a14="http://schemas.microsoft.com/office/drawing/2010/main" val="0"/>
-              </a:ext>
-            </a:extLst>
-          </a:blip>
-          <a:srcRect/>
-          <a:stretch>
-            <a:fillRect/>
-          </a:stretch>
-        </p:blipFill>
-        <p:spPr bwMode="auto">
-          <a:xfrm>
-            <a:off x="9027147" y="4835417"/>
-            <a:ext cx="2857500" cy="1600200"/>
-          </a:xfrm>
-          <a:prstGeom prst="rect">
-            <a:avLst/>
-          </a:prstGeom>
-          <a:noFill/>
-          <a:extLst>
-            <a:ext uri="{909E8E84-426E-40DD-AFC4-6F175D3DCCD1}">
-              <a14:hiddenFill xmlns:a14="http://schemas.microsoft.com/office/drawing/2010/main">
-                <a:solidFill>
-                  <a:srgbClr val="FFFFFF"/>
-                </a:solidFill>
-              </a14:hiddenFill>
-            </a:ext>
-          </a:extLst>
-        </p:spPr>
-      </p:pic>
-      <p:sp>
-        <p:nvSpPr>
-          <p:cNvPr id="4" name="ZoneTexte 3"/>
-          <p:cNvSpPr txBox="1"/>
-          <p:nvPr/>
-        </p:nvSpPr>
-        <p:spPr>
-          <a:xfrm>
-            <a:off x="9027147" y="4466085"/>
-            <a:ext cx="2857500" cy="369332"/>
-          </a:xfrm>
-          <a:prstGeom prst="rect">
-            <a:avLst/>
-          </a:prstGeom>
-          <a:noFill/>
-        </p:spPr>
-        <p:txBody>
-          <a:bodyPr wrap="square" rtlCol="0">
-            <a:spAutoFit/>
-          </a:bodyPr>
-          <a:lstStyle/>
-          <a:p>
-            <a:r>
-              <a:rPr lang="fr-CH" dirty="0" smtClean="0"/>
-              <a:t>Collaboration</a:t>
-            </a:r>
-            <a:endParaRPr lang="fr-FR" dirty="0"/>
-          </a:p>
-        </p:txBody>
-      </p:sp>
-      <p:pic>
-        <p:nvPicPr>
-          <p:cNvPr id="5" name="Image 4"/>
-          <p:cNvPicPr>
-            <a:picLocks noChangeAspect="1"/>
-          </p:cNvPicPr>
-          <p:nvPr/>
-        </p:nvPicPr>
-        <p:blipFill>
-          <a:blip r:embed="rId3"/>
-          <a:stretch>
-            <a:fillRect/>
-          </a:stretch>
-        </p:blipFill>
-        <p:spPr>
-          <a:xfrm>
-            <a:off x="1427525" y="1372616"/>
-            <a:ext cx="9191625" cy="3038475"/>
-          </a:xfrm>
-          <a:prstGeom prst="rect">
-            <a:avLst/>
-          </a:prstGeom>
-        </p:spPr>
-      </p:pic>
-      <p:pic>
-        <p:nvPicPr>
-          <p:cNvPr id="4106" name="Picture 10" descr="Siks/cbs Datacamp Spark Tutorial Notebook - Jupyter Notebook Icon - Free  Transparent PNG Clipart Images Download"/>
-          <p:cNvPicPr>
-            <a:picLocks noChangeAspect="1" noChangeArrowheads="1"/>
-          </p:cNvPicPr>
-          <p:nvPr/>
-        </p:nvPicPr>
-        <p:blipFill>
-          <a:blip r:embed="rId4">
-            <a:extLst>
-              <a:ext uri="{28A0092B-C50C-407E-A947-70E740481C1C}">
-                <a14:useLocalDpi xmlns:a14="http://schemas.microsoft.com/office/drawing/2010/main" val="0"/>
-              </a:ext>
-            </a:extLst>
-          </a:blip>
-          <a:srcRect/>
-          <a:stretch>
-            <a:fillRect/>
-          </a:stretch>
-        </p:blipFill>
-        <p:spPr bwMode="auto">
-          <a:xfrm>
-            <a:off x="2223645" y="4835417"/>
-            <a:ext cx="3617772" cy="1946706"/>
-          </a:xfrm>
-          <a:prstGeom prst="rect">
-            <a:avLst/>
-          </a:prstGeom>
-          <a:noFill/>
-          <a:extLst>
-            <a:ext uri="{909E8E84-426E-40DD-AFC4-6F175D3DCCD1}">
-              <a14:hiddenFill xmlns:a14="http://schemas.microsoft.com/office/drawing/2010/main">
-                <a:solidFill>
-                  <a:srgbClr val="FFFFFF"/>
-                </a:solidFill>
-              </a14:hiddenFill>
-            </a:ext>
-          </a:extLst>
-        </p:spPr>
-      </p:pic>
-      <p:sp>
-        <p:nvSpPr>
-          <p:cNvPr id="11" name="ZoneTexte 10"/>
-          <p:cNvSpPr txBox="1"/>
-          <p:nvPr/>
-        </p:nvSpPr>
-        <p:spPr>
-          <a:xfrm>
-            <a:off x="2133017" y="4466085"/>
-            <a:ext cx="2857500" cy="646331"/>
-          </a:xfrm>
-          <a:prstGeom prst="rect">
-            <a:avLst/>
-          </a:prstGeom>
-          <a:noFill/>
-        </p:spPr>
-        <p:txBody>
-          <a:bodyPr wrap="square" rtlCol="0">
-            <a:spAutoFit/>
-          </a:bodyPr>
-          <a:lstStyle/>
-          <a:p>
-            <a:r>
-              <a:rPr lang="fr-CH" dirty="0"/>
-              <a:t>coding</a:t>
-            </a:r>
-          </a:p>
-          <a:p>
-            <a:endParaRPr lang="fr-FR" dirty="0"/>
-          </a:p>
-        </p:txBody>
-      </p:sp>
-    </p:spTree>
-    <p:extLst>
-      <p:ext uri="{BB962C8B-B14F-4D97-AF65-F5344CB8AC3E}">
-        <p14:creationId xmlns:p14="http://schemas.microsoft.com/office/powerpoint/2010/main" val="773011577"/>
-      </p:ext>
-    </p:extLst>
-  </p:cSld>
-  <p:clrMapOvr>
-    <a:masterClrMapping/>
-  </p:clrMapOvr>
-  <p:timing>
-    <p:tnLst>
-      <p:par>
-        <p:cTn id="1" dur="indefinite" restart="never" nodeType="tmRoot"/>
-      </p:par>
-    </p:tnLst>
-  </p:timing>
-</p:sld>
-</file>
-
-<file path=ppt/slides/slide5.xml><?xml version="1.0" encoding="utf-8"?>
-<p:sld xmlns:a="http://schemas.openxmlformats.org/drawingml/2006/main" xmlns:r="http://schemas.openxmlformats.org/officeDocument/2006/relationships" xmlns:p="http://schemas.openxmlformats.org/presentationml/2006/main">
-  <p:cSld>
-    <p:spTree>
-      <p:nvGrpSpPr>
-        <p:cNvPr id="1" name=""/>
-        <p:cNvGrpSpPr/>
-        <p:nvPr/>
-      </p:nvGrpSpPr>
-      <p:grpSpPr>
-        <a:xfrm>
-          <a:off x="0" y="0"/>
-          <a:ext cx="0" cy="0"/>
-          <a:chOff x="0" y="0"/>
-          <a:chExt cx="0" cy="0"/>
-        </a:xfrm>
-      </p:grpSpPr>
-      <p:sp>
-        <p:nvSpPr>
           <p:cNvPr id="2" name="Titre 1">
             <a:extLst>
               <a:ext uri="{FF2B5EF4-FFF2-40B4-BE49-F238E27FC236}">
-                <a16:creationId xmlns:a16="http://schemas.microsoft.com/office/drawing/2014/main" xmlns="" id="{26D30844-C197-4C58-B7B3-F2A95ED8975A}"/>
+                <a16:creationId xmlns:a16="http://schemas.microsoft.com/office/drawing/2014/main" id="{26D30844-C197-4C58-B7B3-F2A95ED8975A}"/>
               </a:ext>
             </a:extLst>
           </p:cNvPr>
@@ -7142,36 +6756,20 @@
           <a:lstStyle/>
           <a:p>
             <a:pPr algn="ctr"/>
-            <a:r>
-              <a:rPr lang="fr-CH" b="1" dirty="0" smtClean="0">
-                <a:solidFill>
-                  <a:schemeClr val="accent1"/>
-                </a:solidFill>
-              </a:rPr>
-              <a:t/>
-            </a:r>
             <a:br>
-              <a:rPr lang="fr-CH" b="1" dirty="0" smtClean="0">
+              <a:rPr lang="fr-CH" b="1" dirty="0">
                 <a:solidFill>
                   <a:schemeClr val="accent1"/>
                 </a:solidFill>
               </a:rPr>
             </a:br>
             <a:r>
-              <a:rPr lang="fr-CH" b="1" dirty="0" smtClean="0">
+              <a:rPr lang="fr-CH" b="1" dirty="0">
                 <a:solidFill>
                   <a:schemeClr val="accent1"/>
                 </a:solidFill>
               </a:rPr>
               <a:t>THE REPRODUCIBILITY</a:t>
-            </a:r>
-            <a:r>
-              <a:rPr lang="fr-CH" dirty="0">
-                <a:solidFill>
-                  <a:schemeClr val="bg1"/>
-                </a:solidFill>
-              </a:rPr>
-              <a:t/>
             </a:r>
             <a:br>
               <a:rPr lang="fr-CH" dirty="0">
@@ -7189,7 +6787,7 @@
           <p:cNvPr id="5" name="Espace réservé du contenu 4" descr="Une image contenant capture d’écran&#10;&#10;Description générée automatiquement">
             <a:extLst>
               <a:ext uri="{FF2B5EF4-FFF2-40B4-BE49-F238E27FC236}">
-                <a16:creationId xmlns:a16="http://schemas.microsoft.com/office/drawing/2014/main" xmlns="" id="{AE18889E-06B4-480A-9211-5A42D15B7659}"/>
+                <a16:creationId xmlns:a16="http://schemas.microsoft.com/office/drawing/2014/main" id="{AE18889E-06B4-480A-9211-5A42D15B7659}"/>
               </a:ext>
             </a:extLst>
           </p:cNvPr>
@@ -7224,7 +6822,7 @@
           <p:cNvPr id="6" name="ZoneTexte 5">
             <a:extLst>
               <a:ext uri="{FF2B5EF4-FFF2-40B4-BE49-F238E27FC236}">
-                <a16:creationId xmlns:a16="http://schemas.microsoft.com/office/drawing/2014/main" xmlns="" id="{A11BF9E4-AAEC-4C9B-896E-8644EF22A1D9}"/>
+                <a16:creationId xmlns:a16="http://schemas.microsoft.com/office/drawing/2014/main" id="{A11BF9E4-AAEC-4C9B-896E-8644EF22A1D9}"/>
               </a:ext>
             </a:extLst>
           </p:cNvPr>
@@ -7293,7 +6891,7 @@
           <p:cNvPr id="8" name="Graphique 7" descr="Coche">
             <a:extLst>
               <a:ext uri="{FF2B5EF4-FFF2-40B4-BE49-F238E27FC236}">
-                <a16:creationId xmlns:a16="http://schemas.microsoft.com/office/drawing/2014/main" xmlns="" id="{B7BF1F6B-618D-41CC-B150-4B3BA69ECF7E}"/>
+                <a16:creationId xmlns:a16="http://schemas.microsoft.com/office/drawing/2014/main" id="{B7BF1F6B-618D-41CC-B150-4B3BA69ECF7E}"/>
               </a:ext>
             </a:extLst>
           </p:cNvPr>
@@ -7309,7 +6907,7 @@
                 <a14:useLocalDpi xmlns:a14="http://schemas.microsoft.com/office/drawing/2010/main" val="0"/>
               </a:ext>
               <a:ext uri="{96DAC541-7B7A-43D3-8B79-37D633B846F1}">
-                <asvg:svgBlip xmlns:asvg="http://schemas.microsoft.com/office/drawing/2016/SVG/main" xmlns="" r:embed="rId4"/>
+                <asvg:svgBlip xmlns:asvg="http://schemas.microsoft.com/office/drawing/2016/SVG/main" r:embed="rId4"/>
               </a:ext>
             </a:extLst>
           </a:blip>
@@ -7332,7 +6930,7 @@
           <p:cNvPr id="10" name="Graphique 9" descr="Coche">
             <a:extLst>
               <a:ext uri="{FF2B5EF4-FFF2-40B4-BE49-F238E27FC236}">
-                <a16:creationId xmlns:a16="http://schemas.microsoft.com/office/drawing/2014/main" xmlns="" id="{EDAA1B62-66A4-43EE-A237-327230703439}"/>
+                <a16:creationId xmlns:a16="http://schemas.microsoft.com/office/drawing/2014/main" id="{EDAA1B62-66A4-43EE-A237-327230703439}"/>
               </a:ext>
             </a:extLst>
           </p:cNvPr>
@@ -7348,7 +6946,7 @@
                 <a14:useLocalDpi xmlns:a14="http://schemas.microsoft.com/office/drawing/2010/main" val="0"/>
               </a:ext>
               <a:ext uri="{96DAC541-7B7A-43D3-8B79-37D633B846F1}">
-                <asvg:svgBlip xmlns:asvg="http://schemas.microsoft.com/office/drawing/2016/SVG/main" xmlns="" r:embed="rId4"/>
+                <asvg:svgBlip xmlns:asvg="http://schemas.microsoft.com/office/drawing/2016/SVG/main" r:embed="rId4"/>
               </a:ext>
             </a:extLst>
           </a:blip>
@@ -7358,7 +6956,7 @@
         </p:blipFill>
         <p:spPr>
           <a:xfrm>
-            <a:off x="4511476" y="1243228"/>
+            <a:off x="3872421" y="1281306"/>
             <a:ext cx="778155" cy="778155"/>
           </a:xfrm>
           <a:prstGeom prst="rect">
@@ -7371,7 +6969,7 @@
           <p:cNvPr id="12" name="Graphique 11" descr="Fermer">
             <a:extLst>
               <a:ext uri="{FF2B5EF4-FFF2-40B4-BE49-F238E27FC236}">
-                <a16:creationId xmlns:a16="http://schemas.microsoft.com/office/drawing/2014/main" xmlns="" id="{5FB9E98B-8543-4A16-811C-0689AB77A2E3}"/>
+                <a16:creationId xmlns:a16="http://schemas.microsoft.com/office/drawing/2014/main" id="{5FB9E98B-8543-4A16-811C-0689AB77A2E3}"/>
               </a:ext>
             </a:extLst>
           </p:cNvPr>
@@ -7387,7 +6985,7 @@
                 <a14:useLocalDpi xmlns:a14="http://schemas.microsoft.com/office/drawing/2010/main" val="0"/>
               </a:ext>
               <a:ext uri="{96DAC541-7B7A-43D3-8B79-37D633B846F1}">
-                <asvg:svgBlip xmlns:asvg="http://schemas.microsoft.com/office/drawing/2016/SVG/main" xmlns="" r:embed="rId6"/>
+                <asvg:svgBlip xmlns:asvg="http://schemas.microsoft.com/office/drawing/2016/SVG/main" r:embed="rId6"/>
               </a:ext>
             </a:extLst>
           </a:blip>
@@ -7397,7 +6995,7 @@
         </p:blipFill>
         <p:spPr>
           <a:xfrm>
-            <a:off x="8879709" y="2192451"/>
+            <a:off x="7836234" y="1364182"/>
             <a:ext cx="671176" cy="671176"/>
           </a:xfrm>
           <a:prstGeom prst="rect">
@@ -7410,7 +7008,7 @@
           <p:cNvPr id="14" name="Graphique 13" descr="Flèches de chevron">
             <a:extLst>
               <a:ext uri="{FF2B5EF4-FFF2-40B4-BE49-F238E27FC236}">
-                <a16:creationId xmlns:a16="http://schemas.microsoft.com/office/drawing/2014/main" xmlns="" id="{7793A0B9-2D3D-43C1-8B0B-9EB5001B4E95}"/>
+                <a16:creationId xmlns:a16="http://schemas.microsoft.com/office/drawing/2014/main" id="{7793A0B9-2D3D-43C1-8B0B-9EB5001B4E95}"/>
               </a:ext>
             </a:extLst>
           </p:cNvPr>
@@ -7426,7 +7024,7 @@
                 <a14:useLocalDpi xmlns:a14="http://schemas.microsoft.com/office/drawing/2010/main" val="0"/>
               </a:ext>
               <a:ext uri="{96DAC541-7B7A-43D3-8B79-37D633B846F1}">
-                <asvg:svgBlip xmlns:asvg="http://schemas.microsoft.com/office/drawing/2016/SVG/main" xmlns="" r:embed="rId8"/>
+                <asvg:svgBlip xmlns:asvg="http://schemas.microsoft.com/office/drawing/2016/SVG/main" r:embed="rId8"/>
               </a:ext>
             </a:extLst>
           </a:blip>
@@ -7436,7 +7034,7 @@
         </p:blipFill>
         <p:spPr>
           <a:xfrm rot="16200000">
-            <a:off x="6818014" y="1199313"/>
+            <a:off x="5796641" y="1194039"/>
             <a:ext cx="788309" cy="788309"/>
           </a:xfrm>
           <a:prstGeom prst="rect">
@@ -7467,7 +7065,7 @@
           <a:lstStyle/>
           <a:p>
             <a:r>
-              <a:rPr lang="fr-CH" dirty="0" smtClean="0"/>
+              <a:rPr lang="fr-CH" dirty="0"/>
               <a:t>Code structure</a:t>
             </a:r>
             <a:endParaRPr lang="fr-FR" dirty="0"/>
@@ -7521,8 +7119,16 @@
           <a:lstStyle/>
           <a:p>
             <a:r>
-              <a:rPr lang="fr-CH" dirty="0" smtClean="0"/>
-              <a:t>Project full documented</a:t>
+              <a:rPr lang="fr-CH" dirty="0"/>
+              <a:t>Project </a:t>
+            </a:r>
+            <a:r>
+              <a:rPr lang="fr-CH" dirty="0" err="1"/>
+              <a:t>fully</a:t>
+            </a:r>
+            <a:r>
+              <a:rPr lang="fr-CH" dirty="0"/>
+              <a:t> documented</a:t>
             </a:r>
             <a:endParaRPr lang="fr-FR" dirty="0"/>
           </a:p>
@@ -7538,17 +7144,10 @@
   <p:clrMapOvr>
     <a:masterClrMapping/>
   </p:clrMapOvr>
-  <p:timing>
-    <p:tnLst>
-      <p:par>
-        <p:cTn id="1" dur="indefinite" restart="never" nodeType="tmRoot"/>
-      </p:par>
-    </p:tnLst>
-  </p:timing>
 </p:sld>
 </file>
 
-<file path=ppt/slides/slide6.xml><?xml version="1.0" encoding="utf-8"?>
+<file path=ppt/slides/slide5.xml><?xml version="1.0" encoding="utf-8"?>
 <p:sld xmlns:a="http://schemas.openxmlformats.org/drawingml/2006/main" xmlns:r="http://schemas.openxmlformats.org/officeDocument/2006/relationships" xmlns:p="http://schemas.openxmlformats.org/presentationml/2006/main">
   <p:cSld>
     <p:spTree>
@@ -7611,7 +7210,7 @@
           <p:cNvPr id="6" name="Titre 1">
             <a:extLst>
               <a:ext uri="{FF2B5EF4-FFF2-40B4-BE49-F238E27FC236}">
-                <a16:creationId xmlns:a16="http://schemas.microsoft.com/office/drawing/2014/main" xmlns="" id="{26D30844-C197-4C58-B7B3-F2A95ED8975A}"/>
+                <a16:creationId xmlns:a16="http://schemas.microsoft.com/office/drawing/2014/main" id="{26D30844-C197-4C58-B7B3-F2A95ED8975A}"/>
               </a:ext>
             </a:extLst>
           </p:cNvPr>
@@ -7711,22 +7310,14 @@
           </a:lstStyle>
           <a:p>
             <a:pPr algn="ctr"/>
-            <a:r>
-              <a:rPr lang="fr-CH" b="1" dirty="0" smtClean="0">
-                <a:solidFill>
-                  <a:schemeClr val="accent1"/>
-                </a:solidFill>
-              </a:rPr>
-              <a:t/>
-            </a:r>
             <a:br>
-              <a:rPr lang="fr-CH" b="1" dirty="0" smtClean="0">
+              <a:rPr lang="fr-CH" b="1" dirty="0">
                 <a:solidFill>
                   <a:schemeClr val="accent1"/>
                 </a:solidFill>
               </a:rPr>
             </a:br>
-            <a:endParaRPr lang="fr-CH" b="1" dirty="0" smtClean="0">
+            <a:endParaRPr lang="fr-CH" b="1" dirty="0">
               <a:solidFill>
                 <a:schemeClr val="accent1"/>
               </a:solidFill>
@@ -7735,23 +7326,15 @@
           <a:p>
             <a:pPr algn="ctr"/>
             <a:r>
-              <a:rPr lang="fr-CH" sz="14400" b="1" dirty="0" smtClean="0">
+              <a:rPr lang="fr-CH" sz="14400" b="1" dirty="0">
                 <a:solidFill>
                   <a:schemeClr val="accent1"/>
                 </a:solidFill>
               </a:rPr>
               <a:t>Demo and next steps</a:t>
             </a:r>
-            <a:r>
-              <a:rPr lang="fr-CH" sz="14400" dirty="0" smtClean="0">
-                <a:solidFill>
-                  <a:schemeClr val="bg1"/>
-                </a:solidFill>
-              </a:rPr>
-              <a:t/>
-            </a:r>
             <a:br>
-              <a:rPr lang="fr-CH" sz="14400" dirty="0" smtClean="0">
+              <a:rPr lang="fr-CH" sz="14400" dirty="0">
                 <a:solidFill>
                   <a:schemeClr val="bg1"/>
                 </a:solidFill>
@@ -7765,924 +7348,6 @@
     <p:extLst>
       <p:ext uri="{BB962C8B-B14F-4D97-AF65-F5344CB8AC3E}">
         <p14:creationId xmlns:p14="http://schemas.microsoft.com/office/powerpoint/2010/main" val="1631127591"/>
-      </p:ext>
-    </p:extLst>
-  </p:cSld>
-  <p:clrMapOvr>
-    <a:masterClrMapping/>
-  </p:clrMapOvr>
-  <p:timing>
-    <p:tnLst>
-      <p:par>
-        <p:cTn id="1" dur="indefinite" restart="never" nodeType="tmRoot"/>
-      </p:par>
-    </p:tnLst>
-  </p:timing>
-</p:sld>
-</file>
-
-<file path=ppt/slides/slide7.xml><?xml version="1.0" encoding="utf-8"?>
-<p:sld xmlns:a="http://schemas.openxmlformats.org/drawingml/2006/main" xmlns:r="http://schemas.openxmlformats.org/officeDocument/2006/relationships" xmlns:p="http://schemas.openxmlformats.org/presentationml/2006/main">
-  <p:cSld>
-    <p:spTree>
-      <p:nvGrpSpPr>
-        <p:cNvPr id="1" name=""/>
-        <p:cNvGrpSpPr/>
-        <p:nvPr/>
-      </p:nvGrpSpPr>
-      <p:grpSpPr>
-        <a:xfrm>
-          <a:off x="0" y="0"/>
-          <a:ext cx="0" cy="0"/>
-          <a:chOff x="0" y="0"/>
-          <a:chExt cx="0" cy="0"/>
-        </a:xfrm>
-      </p:grpSpPr>
-      <p:sp>
-        <p:nvSpPr>
-          <p:cNvPr id="2" name="Titre 1">
-            <a:extLst>
-              <a:ext uri="{FF2B5EF4-FFF2-40B4-BE49-F238E27FC236}">
-                <a16:creationId xmlns:a16="http://schemas.microsoft.com/office/drawing/2014/main" xmlns="" id="{BDA1F30B-5126-4C07-8DF0-DFCBF682ADAD}"/>
-              </a:ext>
-            </a:extLst>
-          </p:cNvPr>
-          <p:cNvSpPr>
-            <a:spLocks noGrp="1"/>
-          </p:cNvSpPr>
-          <p:nvPr>
-            <p:ph type="title"/>
-          </p:nvPr>
-        </p:nvSpPr>
-        <p:spPr>
-          <a:xfrm>
-            <a:off x="838200" y="346271"/>
-            <a:ext cx="10515600" cy="1325563"/>
-          </a:xfrm>
-        </p:spPr>
-        <p:txBody>
-          <a:bodyPr vert="horz" lIns="91440" tIns="45720" rIns="91440" bIns="45720" rtlCol="0" anchor="ctr">
-            <a:normAutofit/>
-          </a:bodyPr>
-          <a:lstStyle/>
-          <a:p>
-            <a:r>
-              <a:rPr lang="en-US" dirty="0"/>
-              <a:t>Hypotheses</a:t>
-            </a:r>
-            <a:endParaRPr lang="en-US" sz="5400" dirty="0"/>
-          </a:p>
-        </p:txBody>
-      </p:sp>
-      <p:sp>
-        <p:nvSpPr>
-          <p:cNvPr id="3" name="Espace réservé du contenu 2">
-            <a:extLst>
-              <a:ext uri="{FF2B5EF4-FFF2-40B4-BE49-F238E27FC236}">
-                <a16:creationId xmlns:a16="http://schemas.microsoft.com/office/drawing/2014/main" xmlns="" id="{B4AA6A43-FB14-4252-8280-094535BF9870}"/>
-              </a:ext>
-            </a:extLst>
-          </p:cNvPr>
-          <p:cNvSpPr>
-            <a:spLocks noGrp="1"/>
-          </p:cNvSpPr>
-          <p:nvPr>
-            <p:ph idx="1"/>
-          </p:nvPr>
-        </p:nvSpPr>
-        <p:spPr>
-          <a:xfrm>
-            <a:off x="838200" y="1671834"/>
-            <a:ext cx="10515600" cy="4084981"/>
-          </a:xfrm>
-        </p:spPr>
-        <p:txBody>
-          <a:bodyPr>
-            <a:normAutofit lnSpcReduction="10000"/>
-          </a:bodyPr>
-          <a:lstStyle/>
-          <a:p>
-            <a:pPr marL="514350" indent="-514350">
-              <a:buFont typeface="+mj-lt"/>
-              <a:buAutoNum type="arabicPeriod"/>
-            </a:pPr>
-            <a:r>
-              <a:rPr lang="en-US" sz="2400" dirty="0"/>
-              <a:t>If the intrinsic value of a property is defined by different parameters such as the number of rooms or the total surface for example, then it must possible to have an algorithm which can predict with good accuracy the price of a property</a:t>
-            </a:r>
-            <a:r>
-              <a:rPr lang="en-US" sz="2400" dirty="0">
-                <a:effectLst/>
-                <a:ea typeface="Arial" panose="020B0604020202020204" pitchFamily="34" charset="0"/>
-              </a:rPr>
-              <a:t>.</a:t>
-            </a:r>
-          </a:p>
-          <a:p>
-            <a:pPr marL="914400" lvl="2" indent="0">
-              <a:buNone/>
-            </a:pPr>
-            <a:r>
-              <a:rPr lang="en-US" sz="2400" dirty="0">
-                <a:ea typeface="Arial" panose="020B0604020202020204" pitchFamily="34" charset="0"/>
-              </a:rPr>
-              <a:t>→ use the 80 parameters</a:t>
-            </a:r>
-            <a:endParaRPr lang="en-US" sz="2400" dirty="0">
-              <a:effectLst/>
-              <a:ea typeface="Arial" panose="020B0604020202020204" pitchFamily="34" charset="0"/>
-            </a:endParaRPr>
-          </a:p>
-          <a:p>
-            <a:pPr marL="514350" indent="-514350">
-              <a:buFont typeface="+mj-lt"/>
-              <a:buAutoNum type="arabicPeriod"/>
-            </a:pPr>
-            <a:endParaRPr lang="en-US" sz="2400" dirty="0">
-              <a:effectLst/>
-              <a:ea typeface="Arial" panose="020B0604020202020204" pitchFamily="34" charset="0"/>
-            </a:endParaRPr>
-          </a:p>
-          <a:p>
-            <a:pPr marL="514350" indent="-514350">
-              <a:buFont typeface="+mj-lt"/>
-              <a:buAutoNum type="arabicPeriod"/>
-            </a:pPr>
-            <a:r>
-              <a:rPr lang="en-US" sz="2400" dirty="0">
-                <a:effectLst/>
-                <a:ea typeface="Arial" panose="020B0604020202020204" pitchFamily="34" charset="0"/>
-              </a:rPr>
-              <a:t>If some parameters are more meaningful than others to explain the price of a house, then by taking into account only these parameters the price of a house should be still predictable.</a:t>
-            </a:r>
-          </a:p>
-          <a:p>
-            <a:pPr marL="457200" lvl="1" indent="0">
-              <a:buNone/>
-            </a:pPr>
-            <a:r>
-              <a:rPr lang="en-US" dirty="0">
-                <a:ea typeface="Arial" panose="020B0604020202020204" pitchFamily="34" charset="0"/>
-              </a:rPr>
-              <a:t>	 → use only the most relevant parameters</a:t>
-            </a:r>
-            <a:endParaRPr lang="en-US" sz="2400" dirty="0">
-              <a:effectLst/>
-              <a:ea typeface="Arial" panose="020B0604020202020204" pitchFamily="34" charset="0"/>
-            </a:endParaRPr>
-          </a:p>
-          <a:p>
-            <a:pPr marL="0" indent="0">
-              <a:buNone/>
-            </a:pPr>
-            <a:endParaRPr lang="en-US" sz="2400" dirty="0">
-              <a:ea typeface="Arial" panose="020B0604020202020204" pitchFamily="34" charset="0"/>
-            </a:endParaRPr>
-          </a:p>
-          <a:p>
-            <a:pPr marL="0" indent="0">
-              <a:buNone/>
-            </a:pPr>
-            <a:endParaRPr lang="fr-CH" dirty="0"/>
-          </a:p>
-        </p:txBody>
-      </p:sp>
-    </p:spTree>
-    <p:extLst>
-      <p:ext uri="{BB962C8B-B14F-4D97-AF65-F5344CB8AC3E}">
-        <p14:creationId xmlns:p14="http://schemas.microsoft.com/office/powerpoint/2010/main" val="3949311496"/>
-      </p:ext>
-    </p:extLst>
-  </p:cSld>
-  <p:clrMapOvr>
-    <a:masterClrMapping/>
-  </p:clrMapOvr>
-  <p:timing>
-    <p:tnLst>
-      <p:par>
-        <p:cTn id="1" dur="indefinite" restart="never" nodeType="tmRoot"/>
-      </p:par>
-    </p:tnLst>
-  </p:timing>
-</p:sld>
-</file>
-
-<file path=ppt/slides/slide8.xml><?xml version="1.0" encoding="utf-8"?>
-<p:sld xmlns:a="http://schemas.openxmlformats.org/drawingml/2006/main" xmlns:r="http://schemas.openxmlformats.org/officeDocument/2006/relationships" xmlns:p="http://schemas.openxmlformats.org/presentationml/2006/main">
-  <p:cSld>
-    <p:bg>
-      <p:bgRef idx="1001">
-        <a:schemeClr val="bg1"/>
-      </p:bgRef>
-    </p:bg>
-    <p:spTree>
-      <p:nvGrpSpPr>
-        <p:cNvPr id="1" name=""/>
-        <p:cNvGrpSpPr/>
-        <p:nvPr/>
-      </p:nvGrpSpPr>
-      <p:grpSpPr>
-        <a:xfrm>
-          <a:off x="0" y="0"/>
-          <a:ext cx="0" cy="0"/>
-          <a:chOff x="0" y="0"/>
-          <a:chExt cx="0" cy="0"/>
-        </a:xfrm>
-      </p:grpSpPr>
-      <p:sp>
-        <p:nvSpPr>
-          <p:cNvPr id="4" name="Titre 3">
-            <a:extLst>
-              <a:ext uri="{FF2B5EF4-FFF2-40B4-BE49-F238E27FC236}">
-                <a16:creationId xmlns:a16="http://schemas.microsoft.com/office/drawing/2014/main" xmlns="" id="{5A0E4B8C-D079-4A72-AB30-4F91F8E45482}"/>
-              </a:ext>
-            </a:extLst>
-          </p:cNvPr>
-          <p:cNvSpPr>
-            <a:spLocks noGrp="1"/>
-          </p:cNvSpPr>
-          <p:nvPr>
-            <p:ph type="title"/>
-          </p:nvPr>
-        </p:nvSpPr>
-        <p:spPr>
-          <a:xfrm>
-            <a:off x="838200" y="365125"/>
-            <a:ext cx="10515600" cy="1228005"/>
-          </a:xfrm>
-        </p:spPr>
-        <p:txBody>
-          <a:bodyPr>
-            <a:normAutofit fontScale="90000"/>
-          </a:bodyPr>
-          <a:lstStyle/>
-          <a:p>
-            <a:pPr algn="ctr"/>
-            <a:r>
-              <a:rPr lang="en-US" sz="4000" dirty="0"/>
-              <a:t>Ames Iowa: Alternative to the Boston Housing Data Set</a:t>
-            </a:r>
-            <a:endParaRPr lang="fr-CH" sz="4000" dirty="0"/>
-          </a:p>
-        </p:txBody>
-      </p:sp>
-      <p:sp>
-        <p:nvSpPr>
-          <p:cNvPr id="5" name="Espace réservé du contenu 4">
-            <a:extLst>
-              <a:ext uri="{FF2B5EF4-FFF2-40B4-BE49-F238E27FC236}">
-                <a16:creationId xmlns:a16="http://schemas.microsoft.com/office/drawing/2014/main" xmlns="" id="{9F36CDF7-AB52-45C7-ADAF-AD1A294431AC}"/>
-              </a:ext>
-            </a:extLst>
-          </p:cNvPr>
-          <p:cNvSpPr>
-            <a:spLocks noGrp="1"/>
-          </p:cNvSpPr>
-          <p:nvPr>
-            <p:ph idx="1"/>
-          </p:nvPr>
-        </p:nvSpPr>
-        <p:spPr>
-          <a:xfrm>
-            <a:off x="838200" y="1838225"/>
-            <a:ext cx="10515600" cy="4270344"/>
-          </a:xfrm>
-        </p:spPr>
-        <p:txBody>
-          <a:bodyPr>
-            <a:normAutofit fontScale="92500" lnSpcReduction="10000"/>
-          </a:bodyPr>
-          <a:lstStyle/>
-          <a:p>
-            <a:pPr marL="0" indent="0" algn="ctr">
-              <a:buNone/>
-            </a:pPr>
-            <a:r>
-              <a:rPr lang="en-US" sz="2000" dirty="0"/>
-              <a:t>Predicting the house price is a well-known problem in the field of machine learning. The most famous dataset used for this task is the </a:t>
-            </a:r>
-            <a:r>
-              <a:rPr lang="en-US" sz="2000" i="1" dirty="0"/>
-              <a:t>Boston Housing Data Set</a:t>
-            </a:r>
-            <a:r>
-              <a:rPr lang="en-US" sz="2000" dirty="0"/>
-              <a:t>. In this project, an alternative database was selected. This database has been created for educational purpose only and it was presented in the </a:t>
-            </a:r>
-            <a:r>
-              <a:rPr lang="en-US" sz="2000" i="1" dirty="0"/>
-              <a:t>Journal of Statistics Education</a:t>
-            </a:r>
-            <a:r>
-              <a:rPr lang="en-US" sz="2000" dirty="0"/>
-              <a:t> in 2011.</a:t>
-            </a:r>
-          </a:p>
-          <a:p>
-            <a:pPr marL="0" indent="0">
-              <a:buNone/>
-            </a:pPr>
-            <a:endParaRPr lang="en-US" sz="2000" dirty="0"/>
-          </a:p>
-          <a:p>
-            <a:pPr marL="0" indent="0">
-              <a:buNone/>
-            </a:pPr>
-            <a:r>
-              <a:rPr lang="en-US" sz="2400" b="1" dirty="0"/>
-              <a:t>Objective: </a:t>
-            </a:r>
-            <a:r>
-              <a:rPr lang="en-US" sz="2400" dirty="0"/>
-              <a:t>Predict the house prices using different parameters</a:t>
-            </a:r>
-          </a:p>
-          <a:p>
-            <a:pPr marL="0" indent="0">
-              <a:buNone/>
-            </a:pPr>
-            <a:r>
-              <a:rPr lang="en-US" sz="2400" b="1" dirty="0"/>
-              <a:t>Database</a:t>
-            </a:r>
-          </a:p>
-          <a:p>
-            <a:r>
-              <a:rPr lang="en-US" sz="2400" dirty="0"/>
-              <a:t>2930 observations</a:t>
-            </a:r>
-          </a:p>
-          <a:p>
-            <a:r>
-              <a:rPr lang="en-US" sz="2400" dirty="0"/>
-              <a:t>80 features</a:t>
-            </a:r>
-          </a:p>
-          <a:p>
-            <a:pPr lvl="1"/>
-            <a:r>
-              <a:rPr lang="en-US" sz="1800" dirty="0"/>
-              <a:t>46 categorical parameters</a:t>
-            </a:r>
-          </a:p>
-          <a:p>
-            <a:pPr lvl="1"/>
-            <a:r>
-              <a:rPr lang="en-US" sz="1800" dirty="0"/>
-              <a:t>34 discrete/continuous parameters</a:t>
-            </a:r>
-          </a:p>
-          <a:p>
-            <a:endParaRPr lang="en-US" sz="2000" dirty="0"/>
-          </a:p>
-        </p:txBody>
-      </p:sp>
-    </p:spTree>
-    <p:extLst>
-      <p:ext uri="{BB962C8B-B14F-4D97-AF65-F5344CB8AC3E}">
-        <p14:creationId xmlns:p14="http://schemas.microsoft.com/office/powerpoint/2010/main" val="1818844637"/>
-      </p:ext>
-    </p:extLst>
-  </p:cSld>
-  <p:clrMapOvr>
-    <a:overrideClrMapping bg1="lt1" tx1="dk1" bg2="lt2" tx2="dk2" accent1="accent1" accent2="accent2" accent3="accent3" accent4="accent4" accent5="accent5" accent6="accent6" hlink="hlink" folHlink="folHlink"/>
-  </p:clrMapOvr>
-  <p:timing>
-    <p:tnLst>
-      <p:par>
-        <p:cTn id="1" dur="indefinite" restart="never" nodeType="tmRoot"/>
-      </p:par>
-    </p:tnLst>
-  </p:timing>
-</p:sld>
-</file>
-
-<file path=ppt/slides/slide9.xml><?xml version="1.0" encoding="utf-8"?>
-<p:sld xmlns:a="http://schemas.openxmlformats.org/drawingml/2006/main" xmlns:r="http://schemas.openxmlformats.org/officeDocument/2006/relationships" xmlns:p="http://schemas.openxmlformats.org/presentationml/2006/main">
-  <p:cSld>
-    <p:spTree>
-      <p:nvGrpSpPr>
-        <p:cNvPr id="1" name=""/>
-        <p:cNvGrpSpPr/>
-        <p:nvPr/>
-      </p:nvGrpSpPr>
-      <p:grpSpPr>
-        <a:xfrm>
-          <a:off x="0" y="0"/>
-          <a:ext cx="0" cy="0"/>
-          <a:chOff x="0" y="0"/>
-          <a:chExt cx="0" cy="0"/>
-        </a:xfrm>
-      </p:grpSpPr>
-      <p:sp>
-        <p:nvSpPr>
-          <p:cNvPr id="2" name="Titre 1">
-            <a:extLst>
-              <a:ext uri="{FF2B5EF4-FFF2-40B4-BE49-F238E27FC236}">
-                <a16:creationId xmlns:a16="http://schemas.microsoft.com/office/drawing/2014/main" xmlns="" id="{FD780A01-0872-480C-A2CE-9FED6C630C31}"/>
-              </a:ext>
-            </a:extLst>
-          </p:cNvPr>
-          <p:cNvSpPr>
-            <a:spLocks noGrp="1"/>
-          </p:cNvSpPr>
-          <p:nvPr>
-            <p:ph type="title"/>
-          </p:nvPr>
-        </p:nvSpPr>
-        <p:spPr>
-          <a:xfrm>
-            <a:off x="1089326" y="372157"/>
-            <a:ext cx="8534400" cy="1507067"/>
-          </a:xfrm>
-        </p:spPr>
-        <p:txBody>
-          <a:bodyPr/>
-          <a:lstStyle/>
-          <a:p>
-            <a:r>
-              <a:rPr lang="en-US" dirty="0"/>
-              <a:t>Relevant Parameters Selection</a:t>
-            </a:r>
-          </a:p>
-        </p:txBody>
-      </p:sp>
-      <p:sp>
-        <p:nvSpPr>
-          <p:cNvPr id="3" name="Espace réservé du contenu 2">
-            <a:extLst>
-              <a:ext uri="{FF2B5EF4-FFF2-40B4-BE49-F238E27FC236}">
-                <a16:creationId xmlns:a16="http://schemas.microsoft.com/office/drawing/2014/main" xmlns="" id="{5F6BE723-D848-4286-9E63-E847465E2286}"/>
-              </a:ext>
-            </a:extLst>
-          </p:cNvPr>
-          <p:cNvSpPr>
-            <a:spLocks noGrp="1"/>
-          </p:cNvSpPr>
-          <p:nvPr>
-            <p:ph sz="half" idx="1"/>
-          </p:nvPr>
-        </p:nvSpPr>
-        <p:spPr>
-          <a:xfrm>
-            <a:off x="838200" y="2527614"/>
-            <a:ext cx="5181600" cy="2623827"/>
-          </a:xfrm>
-        </p:spPr>
-        <p:txBody>
-          <a:bodyPr/>
-          <a:lstStyle/>
-          <a:p>
-            <a:r>
-              <a:rPr lang="en-US" dirty="0"/>
-              <a:t>Keep only the discrete/continuous parameters</a:t>
-            </a:r>
-          </a:p>
-          <a:p>
-            <a:r>
-              <a:rPr lang="en-US" dirty="0"/>
-              <a:t>Compute the Pearson correlation factor between each continuous/discrete parameters and the sale price</a:t>
-            </a:r>
-          </a:p>
-        </p:txBody>
-      </p:sp>
-      <p:graphicFrame>
-        <p:nvGraphicFramePr>
-          <p:cNvPr id="4" name="Tableau 4">
-            <a:extLst>
-              <a:ext uri="{FF2B5EF4-FFF2-40B4-BE49-F238E27FC236}">
-                <a16:creationId xmlns:a16="http://schemas.microsoft.com/office/drawing/2014/main" xmlns="" id="{BC45A57F-2857-462B-B8E6-4061C24E3FED}"/>
-              </a:ext>
-            </a:extLst>
-          </p:cNvPr>
-          <p:cNvGraphicFramePr>
-            <a:graphicFrameLocks noGrp="1"/>
-          </p:cNvGraphicFramePr>
-          <p:nvPr>
-            <p:extLst>
-              <p:ext uri="{D42A27DB-BD31-4B8C-83A1-F6EECF244321}">
-                <p14:modId xmlns:p14="http://schemas.microsoft.com/office/powerpoint/2010/main" val="2454440197"/>
-              </p:ext>
-            </p:extLst>
-          </p:nvPr>
-        </p:nvGraphicFramePr>
-        <p:xfrm>
-          <a:off x="6403848" y="1879224"/>
-          <a:ext cx="4949952" cy="4846320"/>
-        </p:xfrm>
-        <a:graphic>
-          <a:graphicData uri="http://schemas.openxmlformats.org/drawingml/2006/table">
-            <a:tbl>
-              <a:tblPr firstRow="1" bandRow="1">
-                <a:tableStyleId>{5C22544A-7EE6-4342-B048-85BDC9FD1C3A}</a:tableStyleId>
-              </a:tblPr>
-              <a:tblGrid>
-                <a:gridCol w="2473452">
-                  <a:extLst>
-                    <a:ext uri="{9D8B030D-6E8A-4147-A177-3AD203B41FA5}">
-                      <a16:colId xmlns:a16="http://schemas.microsoft.com/office/drawing/2014/main" xmlns="" val="1008175159"/>
-                    </a:ext>
-                  </a:extLst>
-                </a:gridCol>
-                <a:gridCol w="2476500">
-                  <a:extLst>
-                    <a:ext uri="{9D8B030D-6E8A-4147-A177-3AD203B41FA5}">
-                      <a16:colId xmlns:a16="http://schemas.microsoft.com/office/drawing/2014/main" xmlns="" val="1882991865"/>
-                    </a:ext>
-                  </a:extLst>
-                </a:gridCol>
-              </a:tblGrid>
-              <a:tr h="362612">
-                <a:tc>
-                  <a:txBody>
-                    <a:bodyPr/>
-                    <a:lstStyle/>
-                    <a:p>
-                      <a:r>
-                        <a:rPr lang="en-US" noProof="0" dirty="0"/>
-                        <a:t>Parameter</a:t>
-                      </a:r>
-                    </a:p>
-                  </a:txBody>
-                  <a:tcPr/>
-                </a:tc>
-                <a:tc>
-                  <a:txBody>
-                    <a:bodyPr/>
-                    <a:lstStyle/>
-                    <a:p>
-                      <a:r>
-                        <a:rPr lang="fr-CH" dirty="0"/>
-                        <a:t>Pearson coefficient</a:t>
-                      </a:r>
-                    </a:p>
-                  </a:txBody>
-                  <a:tcPr/>
-                </a:tc>
-                <a:extLst>
-                  <a:ext uri="{0D108BD9-81ED-4DB2-BD59-A6C34878D82A}">
-                    <a16:rowId xmlns:a16="http://schemas.microsoft.com/office/drawing/2014/main" xmlns="" val="2282776920"/>
-                  </a:ext>
-                </a:extLst>
-              </a:tr>
-              <a:tr h="362612">
-                <a:tc>
-                  <a:txBody>
-                    <a:bodyPr/>
-                    <a:lstStyle/>
-                    <a:p>
-                      <a:pPr algn="ctr"/>
-                      <a:r>
-                        <a:rPr lang="en-US" noProof="0"/>
-                        <a:t>Ground living area (square feet)</a:t>
-                      </a:r>
-                    </a:p>
-                  </a:txBody>
-                  <a:tcPr/>
-                </a:tc>
-                <a:tc>
-                  <a:txBody>
-                    <a:bodyPr/>
-                    <a:lstStyle/>
-                    <a:p>
-                      <a:pPr algn="ctr"/>
-                      <a:r>
-                        <a:rPr lang="en-US" noProof="0"/>
-                        <a:t>0,7</a:t>
-                      </a:r>
-                    </a:p>
-                  </a:txBody>
-                  <a:tcPr/>
-                </a:tc>
-                <a:extLst>
-                  <a:ext uri="{0D108BD9-81ED-4DB2-BD59-A6C34878D82A}">
-                    <a16:rowId xmlns:a16="http://schemas.microsoft.com/office/drawing/2014/main" xmlns="" val="3198475603"/>
-                  </a:ext>
-                </a:extLst>
-              </a:tr>
-              <a:tr h="362612">
-                <a:tc>
-                  <a:txBody>
-                    <a:bodyPr/>
-                    <a:lstStyle/>
-                    <a:p>
-                      <a:pPr algn="ctr"/>
-                      <a:r>
-                        <a:rPr lang="en-US" noProof="0"/>
-                        <a:t>Basement area</a:t>
-                      </a:r>
-                    </a:p>
-                  </a:txBody>
-                  <a:tcPr/>
-                </a:tc>
-                <a:tc>
-                  <a:txBody>
-                    <a:bodyPr/>
-                    <a:lstStyle/>
-                    <a:p>
-                      <a:pPr algn="ctr"/>
-                      <a:r>
-                        <a:rPr lang="en-US" noProof="0"/>
-                        <a:t>0,635</a:t>
-                      </a:r>
-                    </a:p>
-                  </a:txBody>
-                  <a:tcPr/>
-                </a:tc>
-                <a:extLst>
-                  <a:ext uri="{0D108BD9-81ED-4DB2-BD59-A6C34878D82A}">
-                    <a16:rowId xmlns:a16="http://schemas.microsoft.com/office/drawing/2014/main" xmlns="" val="1091696829"/>
-                  </a:ext>
-                </a:extLst>
-              </a:tr>
-              <a:tr h="362612">
-                <a:tc>
-                  <a:txBody>
-                    <a:bodyPr/>
-                    <a:lstStyle/>
-                    <a:p>
-                      <a:pPr algn="ctr"/>
-                      <a:r>
-                        <a:rPr lang="en-US" noProof="0"/>
-                        <a:t>Garage area</a:t>
-                      </a:r>
-                    </a:p>
-                  </a:txBody>
-                  <a:tcPr/>
-                </a:tc>
-                <a:tc>
-                  <a:txBody>
-                    <a:bodyPr/>
-                    <a:lstStyle/>
-                    <a:p>
-                      <a:pPr algn="ctr"/>
-                      <a:r>
-                        <a:rPr lang="en-US" noProof="0"/>
-                        <a:t>0,63</a:t>
-                      </a:r>
-                    </a:p>
-                  </a:txBody>
-                  <a:tcPr/>
-                </a:tc>
-                <a:extLst>
-                  <a:ext uri="{0D108BD9-81ED-4DB2-BD59-A6C34878D82A}">
-                    <a16:rowId xmlns:a16="http://schemas.microsoft.com/office/drawing/2014/main" xmlns="" val="56961239"/>
-                  </a:ext>
-                </a:extLst>
-              </a:tr>
-              <a:tr h="362612">
-                <a:tc>
-                  <a:txBody>
-                    <a:bodyPr/>
-                    <a:lstStyle/>
-                    <a:p>
-                      <a:pPr algn="ctr"/>
-                      <a:r>
-                        <a:rPr lang="en-US" noProof="0"/>
-                        <a:t>1st floor living area</a:t>
-                      </a:r>
-                    </a:p>
-                  </a:txBody>
-                  <a:tcPr/>
-                </a:tc>
-                <a:tc>
-                  <a:txBody>
-                    <a:bodyPr/>
-                    <a:lstStyle/>
-                    <a:p>
-                      <a:pPr algn="ctr"/>
-                      <a:r>
-                        <a:rPr lang="en-US" noProof="0"/>
-                        <a:t>0,625</a:t>
-                      </a:r>
-                    </a:p>
-                  </a:txBody>
-                  <a:tcPr/>
-                </a:tc>
-                <a:extLst>
-                  <a:ext uri="{0D108BD9-81ED-4DB2-BD59-A6C34878D82A}">
-                    <a16:rowId xmlns:a16="http://schemas.microsoft.com/office/drawing/2014/main" xmlns="" val="3940499769"/>
-                  </a:ext>
-                </a:extLst>
-              </a:tr>
-              <a:tr h="362612">
-                <a:tc>
-                  <a:txBody>
-                    <a:bodyPr/>
-                    <a:lstStyle/>
-                    <a:p>
-                      <a:pPr algn="ctr"/>
-                      <a:r>
-                        <a:rPr lang="en-US" noProof="0"/>
-                        <a:t>Year Built</a:t>
-                      </a:r>
-                    </a:p>
-                  </a:txBody>
-                  <a:tcPr/>
-                </a:tc>
-                <a:tc>
-                  <a:txBody>
-                    <a:bodyPr/>
-                    <a:lstStyle/>
-                    <a:p>
-                      <a:pPr algn="ctr"/>
-                      <a:r>
-                        <a:rPr lang="en-US" noProof="0"/>
-                        <a:t>0,56</a:t>
-                      </a:r>
-                    </a:p>
-                  </a:txBody>
-                  <a:tcPr/>
-                </a:tc>
-                <a:extLst>
-                  <a:ext uri="{0D108BD9-81ED-4DB2-BD59-A6C34878D82A}">
-                    <a16:rowId xmlns:a16="http://schemas.microsoft.com/office/drawing/2014/main" xmlns="" val="244446031"/>
-                  </a:ext>
-                </a:extLst>
-              </a:tr>
-              <a:tr h="362612">
-                <a:tc>
-                  <a:txBody>
-                    <a:bodyPr/>
-                    <a:lstStyle/>
-                    <a:p>
-                      <a:pPr algn="ctr"/>
-                      <a:r>
-                        <a:rPr lang="en-US" noProof="0"/>
-                        <a:t>Full Bath</a:t>
-                      </a:r>
-                    </a:p>
-                  </a:txBody>
-                  <a:tcPr/>
-                </a:tc>
-                <a:tc>
-                  <a:txBody>
-                    <a:bodyPr/>
-                    <a:lstStyle/>
-                    <a:p>
-                      <a:pPr algn="ctr"/>
-                      <a:r>
-                        <a:rPr lang="en-US" noProof="0"/>
-                        <a:t>0,536</a:t>
-                      </a:r>
-                    </a:p>
-                  </a:txBody>
-                  <a:tcPr/>
-                </a:tc>
-                <a:extLst>
-                  <a:ext uri="{0D108BD9-81ED-4DB2-BD59-A6C34878D82A}">
-                    <a16:rowId xmlns:a16="http://schemas.microsoft.com/office/drawing/2014/main" xmlns="" val="99387082"/>
-                  </a:ext>
-                </a:extLst>
-              </a:tr>
-              <a:tr h="362612">
-                <a:tc>
-                  <a:txBody>
-                    <a:bodyPr/>
-                    <a:lstStyle/>
-                    <a:p>
-                      <a:pPr algn="ctr"/>
-                      <a:r>
-                        <a:rPr lang="en-US" noProof="0"/>
-                        <a:t>Year Remodel</a:t>
-                      </a:r>
-                    </a:p>
-                  </a:txBody>
-                  <a:tcPr/>
-                </a:tc>
-                <a:tc>
-                  <a:txBody>
-                    <a:bodyPr/>
-                    <a:lstStyle/>
-                    <a:p>
-                      <a:pPr algn="ctr"/>
-                      <a:r>
-                        <a:rPr lang="en-US" noProof="0"/>
-                        <a:t>0,53</a:t>
-                      </a:r>
-                    </a:p>
-                  </a:txBody>
-                  <a:tcPr/>
-                </a:tc>
-                <a:extLst>
-                  <a:ext uri="{0D108BD9-81ED-4DB2-BD59-A6C34878D82A}">
-                    <a16:rowId xmlns:a16="http://schemas.microsoft.com/office/drawing/2014/main" xmlns="" val="2080019347"/>
-                  </a:ext>
-                </a:extLst>
-              </a:tr>
-              <a:tr h="362612">
-                <a:tc>
-                  <a:txBody>
-                    <a:bodyPr/>
-                    <a:lstStyle/>
-                    <a:p>
-                      <a:pPr algn="ctr"/>
-                      <a:r>
-                        <a:rPr lang="en-US" noProof="0"/>
-                        <a:t>Masonry veneer area</a:t>
-                      </a:r>
-                    </a:p>
-                  </a:txBody>
-                  <a:tcPr/>
-                </a:tc>
-                <a:tc>
-                  <a:txBody>
-                    <a:bodyPr/>
-                    <a:lstStyle/>
-                    <a:p>
-                      <a:pPr algn="ctr"/>
-                      <a:r>
-                        <a:rPr lang="en-US" noProof="0"/>
-                        <a:t>0,5</a:t>
-                      </a:r>
-                    </a:p>
-                  </a:txBody>
-                  <a:tcPr/>
-                </a:tc>
-                <a:extLst>
-                  <a:ext uri="{0D108BD9-81ED-4DB2-BD59-A6C34878D82A}">
-                    <a16:rowId xmlns:a16="http://schemas.microsoft.com/office/drawing/2014/main" xmlns="" val="904731388"/>
-                  </a:ext>
-                </a:extLst>
-              </a:tr>
-              <a:tr h="362612">
-                <a:tc>
-                  <a:txBody>
-                    <a:bodyPr/>
-                    <a:lstStyle/>
-                    <a:p>
-                      <a:pPr algn="ctr"/>
-                      <a:r>
-                        <a:rPr lang="en-US" noProof="0"/>
-                        <a:t>Fireplaces</a:t>
-                      </a:r>
-                    </a:p>
-                  </a:txBody>
-                  <a:tcPr/>
-                </a:tc>
-                <a:tc>
-                  <a:txBody>
-                    <a:bodyPr/>
-                    <a:lstStyle/>
-                    <a:p>
-                      <a:pPr algn="ctr"/>
-                      <a:r>
-                        <a:rPr lang="en-US" noProof="0"/>
-                        <a:t>0,49</a:t>
-                      </a:r>
-                    </a:p>
-                  </a:txBody>
-                  <a:tcPr/>
-                </a:tc>
-                <a:extLst>
-                  <a:ext uri="{0D108BD9-81ED-4DB2-BD59-A6C34878D82A}">
-                    <a16:rowId xmlns:a16="http://schemas.microsoft.com/office/drawing/2014/main" xmlns="" val="2225010645"/>
-                  </a:ext>
-                </a:extLst>
-              </a:tr>
-              <a:tr h="362612">
-                <a:tc>
-                  <a:txBody>
-                    <a:bodyPr/>
-                    <a:lstStyle/>
-                    <a:p>
-                      <a:pPr algn="ctr"/>
-                      <a:r>
-                        <a:rPr lang="en-US" noProof="0"/>
-                        <a:t>Total Rooms Above Grd</a:t>
-                      </a:r>
-                    </a:p>
-                  </a:txBody>
-                  <a:tcPr/>
-                </a:tc>
-                <a:tc>
-                  <a:txBody>
-                    <a:bodyPr/>
-                    <a:lstStyle/>
-                    <a:p>
-                      <a:pPr algn="ctr"/>
-                      <a:r>
-                        <a:rPr lang="en-US" noProof="0" dirty="0"/>
-                        <a:t>0,48</a:t>
-                      </a:r>
-                    </a:p>
-                  </a:txBody>
-                  <a:tcPr/>
-                </a:tc>
-                <a:extLst>
-                  <a:ext uri="{0D108BD9-81ED-4DB2-BD59-A6C34878D82A}">
-                    <a16:rowId xmlns:a16="http://schemas.microsoft.com/office/drawing/2014/main" xmlns="" val="3947624056"/>
-                  </a:ext>
-                </a:extLst>
-              </a:tr>
-            </a:tbl>
-          </a:graphicData>
-        </a:graphic>
-      </p:graphicFrame>
-    </p:spTree>
-    <p:extLst>
-      <p:ext uri="{BB962C8B-B14F-4D97-AF65-F5344CB8AC3E}">
-        <p14:creationId xmlns:p14="http://schemas.microsoft.com/office/powerpoint/2010/main" val="1067944545"/>
       </p:ext>
     </p:extLst>
   </p:cSld>

</xml_diff>